<commit_message>
praesentation 1st version  silvana
</commit_message>
<xml_diff>
--- a/presentation/Presentation.pptx
+++ b/presentation/Presentation.pptx
@@ -7,7 +7,7 @@
     <p:sldMasterId id="2147483667" r:id="rId3"/>
   </p:sldMasterIdLst>
   <p:notesMasterIdLst>
-    <p:notesMasterId r:id="rId21"/>
+    <p:notesMasterId r:id="rId26"/>
   </p:notesMasterIdLst>
   <p:sldIdLst>
     <p:sldId id="256" r:id="rId4"/>
@@ -20,13 +20,18 @@
     <p:sldId id="261" r:id="rId11"/>
     <p:sldId id="262" r:id="rId12"/>
     <p:sldId id="263" r:id="rId13"/>
-    <p:sldId id="264" r:id="rId14"/>
-    <p:sldId id="265" r:id="rId15"/>
-    <p:sldId id="266" r:id="rId16"/>
-    <p:sldId id="267" r:id="rId17"/>
-    <p:sldId id="268" r:id="rId18"/>
-    <p:sldId id="269" r:id="rId19"/>
-    <p:sldId id="270" r:id="rId20"/>
+    <p:sldId id="273" r:id="rId14"/>
+    <p:sldId id="276" r:id="rId15"/>
+    <p:sldId id="264" r:id="rId16"/>
+    <p:sldId id="278" r:id="rId17"/>
+    <p:sldId id="277" r:id="rId18"/>
+    <p:sldId id="265" r:id="rId19"/>
+    <p:sldId id="275" r:id="rId20"/>
+    <p:sldId id="266" r:id="rId21"/>
+    <p:sldId id="267" r:id="rId22"/>
+    <p:sldId id="268" r:id="rId23"/>
+    <p:sldId id="269" r:id="rId24"/>
+    <p:sldId id="270" r:id="rId25"/>
   </p:sldIdLst>
   <p:sldSz cx="9144000" cy="6858000" type="screen4x3"/>
   <p:notesSz cx="6858000" cy="9144000"/>
@@ -155,6 +160,11 @@
       </a:defRPr>
     </a:lvl9pPr>
   </p:defaultTextStyle>
+  <p:extLst>
+    <p:ext uri="{EFAFB233-063F-42B5-8137-9DF3F51BA10A}">
+      <p15:sldGuideLst xmlns:p15="http://schemas.microsoft.com/office/powerpoint/2012/main"/>
+    </p:ext>
+  </p:extLst>
 </p:presentation>
 </file>
 
@@ -1002,6 +1012,1263 @@
     <p:extLst>
       <p:ext uri="{BB962C8B-B14F-4D97-AF65-F5344CB8AC3E}">
         <p14:creationId xmlns:p14="http://schemas.microsoft.com/office/powerpoint/2010/main" val="3708552034"/>
+      </p:ext>
+    </p:extLst>
+  </p:cSld>
+  <p:clrMapOvr>
+    <a:masterClrMapping/>
+  </p:clrMapOvr>
+</p:notes>
+</file>
+
+<file path=ppt/notesSlides/notesSlide4.xml><?xml version="1.0" encoding="utf-8"?>
+<p:notes xmlns:a="http://schemas.openxmlformats.org/drawingml/2006/main" xmlns:r="http://schemas.openxmlformats.org/officeDocument/2006/relationships" xmlns:p="http://schemas.openxmlformats.org/presentationml/2006/main">
+  <p:cSld>
+    <p:spTree>
+      <p:nvGrpSpPr>
+        <p:cNvPr id="1" name=""/>
+        <p:cNvGrpSpPr/>
+        <p:nvPr/>
+      </p:nvGrpSpPr>
+      <p:grpSpPr>
+        <a:xfrm>
+          <a:off x="0" y="0"/>
+          <a:ext cx="0" cy="0"/>
+          <a:chOff x="0" y="0"/>
+          <a:chExt cx="0" cy="0"/>
+        </a:xfrm>
+      </p:grpSpPr>
+      <p:sp>
+        <p:nvSpPr>
+          <p:cNvPr id="2" name="Folienbildplatzhalter 1"/>
+          <p:cNvSpPr>
+            <a:spLocks noGrp="1" noRot="1" noChangeAspect="1"/>
+          </p:cNvSpPr>
+          <p:nvPr>
+            <p:ph type="sldImg"/>
+          </p:nvPr>
+        </p:nvSpPr>
+        <p:spPr/>
+      </p:sp>
+      <p:sp>
+        <p:nvSpPr>
+          <p:cNvPr id="3" name="Notizenplatzhalter 2"/>
+          <p:cNvSpPr>
+            <a:spLocks noGrp="1"/>
+          </p:cNvSpPr>
+          <p:nvPr>
+            <p:ph type="body" idx="1"/>
+          </p:nvPr>
+        </p:nvSpPr>
+        <p:spPr/>
+        <p:txBody>
+          <a:bodyPr/>
+          <a:lstStyle/>
+          <a:p>
+            <a:r>
+              <a:rPr lang="de-AT" dirty="0" smtClean="0"/>
+              <a:t>Relevant = </a:t>
+            </a:r>
+            <a:r>
+              <a:rPr lang="de-AT" dirty="0" err="1" smtClean="0"/>
+              <a:t>depends</a:t>
+            </a:r>
+            <a:r>
+              <a:rPr lang="de-AT" dirty="0" smtClean="0"/>
+              <a:t> on </a:t>
+            </a:r>
+            <a:r>
+              <a:rPr lang="de-AT" dirty="0" err="1" smtClean="0"/>
+              <a:t>application</a:t>
+            </a:r>
+            <a:r>
+              <a:rPr lang="de-AT" dirty="0" smtClean="0"/>
+              <a:t>, but in </a:t>
+            </a:r>
+            <a:r>
+              <a:rPr lang="de-AT" dirty="0" err="1" smtClean="0"/>
+              <a:t>genereal</a:t>
+            </a:r>
+            <a:r>
+              <a:rPr lang="de-AT" dirty="0" smtClean="0"/>
+              <a:t>:</a:t>
+            </a:r>
+            <a:br>
+              <a:rPr lang="de-AT" dirty="0" smtClean="0"/>
+            </a:br>
+            <a:r>
+              <a:rPr lang="de-AT" dirty="0" err="1" smtClean="0"/>
+              <a:t>Discriminating</a:t>
+            </a:r>
+            <a:r>
+              <a:rPr lang="de-AT" baseline="0" dirty="0" smtClean="0"/>
+              <a:t> </a:t>
+            </a:r>
+            <a:r>
+              <a:rPr lang="de-AT" baseline="0" dirty="0" err="1" smtClean="0"/>
+              <a:t>feature</a:t>
+            </a:r>
+            <a:r>
+              <a:rPr lang="de-AT" baseline="0" dirty="0" smtClean="0"/>
+              <a:t> = </a:t>
+            </a:r>
+            <a:r>
+              <a:rPr lang="de-AT" baseline="0" dirty="0" err="1" smtClean="0"/>
+              <a:t>when</a:t>
+            </a:r>
+            <a:r>
+              <a:rPr lang="de-AT" baseline="0" dirty="0" smtClean="0"/>
+              <a:t> </a:t>
+            </a:r>
+            <a:r>
+              <a:rPr lang="de-AT" baseline="0" dirty="0" err="1" smtClean="0"/>
+              <a:t>looking</a:t>
+            </a:r>
+            <a:r>
+              <a:rPr lang="de-AT" baseline="0" dirty="0" smtClean="0"/>
+              <a:t> at </a:t>
+            </a:r>
+            <a:r>
+              <a:rPr lang="de-AT" baseline="0" dirty="0" err="1" smtClean="0"/>
+              <a:t>the</a:t>
+            </a:r>
+            <a:r>
+              <a:rPr lang="de-AT" baseline="0" dirty="0" smtClean="0"/>
+              <a:t> </a:t>
+            </a:r>
+            <a:r>
+              <a:rPr lang="de-AT" baseline="0" dirty="0" err="1" smtClean="0"/>
+              <a:t>feature</a:t>
+            </a:r>
+            <a:r>
+              <a:rPr lang="de-AT" baseline="0" dirty="0" smtClean="0"/>
+              <a:t>, </a:t>
+            </a:r>
+            <a:r>
+              <a:rPr lang="de-AT" baseline="0" dirty="0" err="1" smtClean="0"/>
+              <a:t>clear</a:t>
+            </a:r>
+            <a:r>
+              <a:rPr lang="de-AT" baseline="0" dirty="0" smtClean="0"/>
+              <a:t> </a:t>
+            </a:r>
+            <a:r>
+              <a:rPr lang="de-AT" baseline="0" dirty="0" err="1" smtClean="0"/>
+              <a:t>classification</a:t>
+            </a:r>
+            <a:r>
+              <a:rPr lang="de-AT" baseline="0" dirty="0" smtClean="0"/>
+              <a:t> </a:t>
+            </a:r>
+            <a:r>
+              <a:rPr lang="de-AT" baseline="0" dirty="0" err="1" smtClean="0"/>
+              <a:t>can</a:t>
+            </a:r>
+            <a:r>
+              <a:rPr lang="de-AT" baseline="0" dirty="0" smtClean="0"/>
+              <a:t> </a:t>
+            </a:r>
+            <a:r>
+              <a:rPr lang="de-AT" baseline="0" dirty="0" err="1" smtClean="0"/>
+              <a:t>be</a:t>
+            </a:r>
+            <a:r>
+              <a:rPr lang="de-AT" baseline="0" dirty="0" smtClean="0"/>
+              <a:t> </a:t>
+            </a:r>
+            <a:r>
+              <a:rPr lang="de-AT" baseline="0" dirty="0" err="1" smtClean="0"/>
+              <a:t>done</a:t>
+            </a:r>
+            <a:r>
+              <a:rPr lang="de-AT" baseline="0" dirty="0" smtClean="0"/>
+              <a:t> </a:t>
+            </a:r>
+          </a:p>
+          <a:p>
+            <a:r>
+              <a:rPr lang="de-AT" baseline="0" dirty="0" err="1" smtClean="0"/>
+              <a:t>No</a:t>
+            </a:r>
+            <a:r>
+              <a:rPr lang="de-AT" baseline="0" dirty="0" smtClean="0"/>
+              <a:t> </a:t>
+            </a:r>
+            <a:r>
+              <a:rPr lang="de-AT" baseline="0" dirty="0" err="1" smtClean="0"/>
+              <a:t>redundancy</a:t>
+            </a:r>
+            <a:r>
+              <a:rPr lang="de-AT" baseline="0" dirty="0" smtClean="0"/>
+              <a:t> = </a:t>
+            </a:r>
+            <a:r>
+              <a:rPr lang="de-AT" baseline="0" dirty="0" err="1" smtClean="0"/>
+              <a:t>two</a:t>
+            </a:r>
+            <a:r>
+              <a:rPr lang="de-AT" baseline="0" dirty="0" smtClean="0"/>
+              <a:t> </a:t>
+            </a:r>
+            <a:r>
+              <a:rPr lang="de-AT" baseline="0" dirty="0" err="1" smtClean="0"/>
+              <a:t>features</a:t>
+            </a:r>
+            <a:r>
+              <a:rPr lang="de-AT" baseline="0" dirty="0" smtClean="0"/>
+              <a:t> </a:t>
+            </a:r>
+            <a:r>
+              <a:rPr lang="de-AT" baseline="0" dirty="0" err="1" smtClean="0"/>
+              <a:t>should</a:t>
+            </a:r>
+            <a:r>
+              <a:rPr lang="de-AT" baseline="0" dirty="0" smtClean="0"/>
+              <a:t> not </a:t>
+            </a:r>
+            <a:r>
+              <a:rPr lang="de-AT" baseline="0" dirty="0" err="1" smtClean="0"/>
+              <a:t>lead</a:t>
+            </a:r>
+            <a:r>
+              <a:rPr lang="de-AT" baseline="0" dirty="0" smtClean="0"/>
+              <a:t> </a:t>
+            </a:r>
+            <a:r>
+              <a:rPr lang="de-AT" baseline="0" dirty="0" err="1" smtClean="0"/>
+              <a:t>to</a:t>
+            </a:r>
+            <a:r>
+              <a:rPr lang="de-AT" baseline="0" dirty="0" smtClean="0"/>
+              <a:t> same </a:t>
+            </a:r>
+            <a:r>
+              <a:rPr lang="de-AT" baseline="0" dirty="0" err="1" smtClean="0"/>
+              <a:t>information</a:t>
+            </a:r>
+            <a:endParaRPr lang="de-AT" baseline="0" dirty="0" smtClean="0"/>
+          </a:p>
+          <a:p>
+            <a:endParaRPr lang="de-AT" dirty="0"/>
+          </a:p>
+        </p:txBody>
+      </p:sp>
+      <p:sp>
+        <p:nvSpPr>
+          <p:cNvPr id="4" name="Foliennummernplatzhalter 3"/>
+          <p:cNvSpPr>
+            <a:spLocks noGrp="1"/>
+          </p:cNvSpPr>
+          <p:nvPr>
+            <p:ph type="sldNum" sz="quarter" idx="10"/>
+          </p:nvPr>
+        </p:nvSpPr>
+        <p:spPr/>
+        <p:txBody>
+          <a:bodyPr/>
+          <a:lstStyle/>
+          <a:p>
+            <a:fld id="{07914D93-ABC8-448C-8296-85FD12164B61}" type="slidenum">
+              <a:rPr lang="de-DE" altLang="de-DE" smtClean="0"/>
+              <a:pPr/>
+              <a:t>6</a:t>
+            </a:fld>
+            <a:endParaRPr lang="de-DE" altLang="de-DE"/>
+          </a:p>
+        </p:txBody>
+      </p:sp>
+    </p:spTree>
+    <p:extLst>
+      <p:ext uri="{BB962C8B-B14F-4D97-AF65-F5344CB8AC3E}">
+        <p14:creationId xmlns:p14="http://schemas.microsoft.com/office/powerpoint/2010/main" val="1781391592"/>
+      </p:ext>
+    </p:extLst>
+  </p:cSld>
+  <p:clrMapOvr>
+    <a:masterClrMapping/>
+  </p:clrMapOvr>
+</p:notes>
+</file>
+
+<file path=ppt/notesSlides/notesSlide5.xml><?xml version="1.0" encoding="utf-8"?>
+<p:notes xmlns:a="http://schemas.openxmlformats.org/drawingml/2006/main" xmlns:r="http://schemas.openxmlformats.org/officeDocument/2006/relationships" xmlns:p="http://schemas.openxmlformats.org/presentationml/2006/main">
+  <p:cSld>
+    <p:spTree>
+      <p:nvGrpSpPr>
+        <p:cNvPr id="1" name=""/>
+        <p:cNvGrpSpPr/>
+        <p:nvPr/>
+      </p:nvGrpSpPr>
+      <p:grpSpPr>
+        <a:xfrm>
+          <a:off x="0" y="0"/>
+          <a:ext cx="0" cy="0"/>
+          <a:chOff x="0" y="0"/>
+          <a:chExt cx="0" cy="0"/>
+        </a:xfrm>
+      </p:grpSpPr>
+      <p:sp>
+        <p:nvSpPr>
+          <p:cNvPr id="2" name="Folienbildplatzhalter 1"/>
+          <p:cNvSpPr>
+            <a:spLocks noGrp="1" noRot="1" noChangeAspect="1"/>
+          </p:cNvSpPr>
+          <p:nvPr>
+            <p:ph type="sldImg"/>
+          </p:nvPr>
+        </p:nvSpPr>
+        <p:spPr/>
+      </p:sp>
+      <p:sp>
+        <p:nvSpPr>
+          <p:cNvPr id="3" name="Notizenplatzhalter 2"/>
+          <p:cNvSpPr>
+            <a:spLocks noGrp="1"/>
+          </p:cNvSpPr>
+          <p:nvPr>
+            <p:ph type="body" idx="1"/>
+          </p:nvPr>
+        </p:nvSpPr>
+        <p:spPr/>
+        <p:txBody>
+          <a:bodyPr/>
+          <a:lstStyle/>
+          <a:p>
+            <a:endParaRPr lang="de-AT" dirty="0"/>
+          </a:p>
+        </p:txBody>
+      </p:sp>
+      <p:sp>
+        <p:nvSpPr>
+          <p:cNvPr id="4" name="Foliennummernplatzhalter 3"/>
+          <p:cNvSpPr>
+            <a:spLocks noGrp="1"/>
+          </p:cNvSpPr>
+          <p:nvPr>
+            <p:ph type="sldNum" sz="quarter" idx="10"/>
+          </p:nvPr>
+        </p:nvSpPr>
+        <p:spPr/>
+        <p:txBody>
+          <a:bodyPr/>
+          <a:lstStyle/>
+          <a:p>
+            <a:fld id="{07914D93-ABC8-448C-8296-85FD12164B61}" type="slidenum">
+              <a:rPr lang="de-DE" altLang="de-DE" smtClean="0"/>
+              <a:pPr/>
+              <a:t>10</a:t>
+            </a:fld>
+            <a:endParaRPr lang="de-DE" altLang="de-DE"/>
+          </a:p>
+        </p:txBody>
+      </p:sp>
+    </p:spTree>
+    <p:extLst>
+      <p:ext uri="{BB962C8B-B14F-4D97-AF65-F5344CB8AC3E}">
+        <p14:creationId xmlns:p14="http://schemas.microsoft.com/office/powerpoint/2010/main" val="1935011210"/>
+      </p:ext>
+    </p:extLst>
+  </p:cSld>
+  <p:clrMapOvr>
+    <a:masterClrMapping/>
+  </p:clrMapOvr>
+</p:notes>
+</file>
+
+<file path=ppt/notesSlides/notesSlide6.xml><?xml version="1.0" encoding="utf-8"?>
+<p:notes xmlns:a="http://schemas.openxmlformats.org/drawingml/2006/main" xmlns:r="http://schemas.openxmlformats.org/officeDocument/2006/relationships" xmlns:p="http://schemas.openxmlformats.org/presentationml/2006/main">
+  <p:cSld>
+    <p:spTree>
+      <p:nvGrpSpPr>
+        <p:cNvPr id="1" name=""/>
+        <p:cNvGrpSpPr/>
+        <p:nvPr/>
+      </p:nvGrpSpPr>
+      <p:grpSpPr>
+        <a:xfrm>
+          <a:off x="0" y="0"/>
+          <a:ext cx="0" cy="0"/>
+          <a:chOff x="0" y="0"/>
+          <a:chExt cx="0" cy="0"/>
+        </a:xfrm>
+      </p:grpSpPr>
+      <p:sp>
+        <p:nvSpPr>
+          <p:cNvPr id="2" name="Folienbildplatzhalter 1"/>
+          <p:cNvSpPr>
+            <a:spLocks noGrp="1" noRot="1" noChangeAspect="1"/>
+          </p:cNvSpPr>
+          <p:nvPr>
+            <p:ph type="sldImg"/>
+          </p:nvPr>
+        </p:nvSpPr>
+        <p:spPr/>
+      </p:sp>
+      <p:sp>
+        <p:nvSpPr>
+          <p:cNvPr id="3" name="Notizenplatzhalter 2"/>
+          <p:cNvSpPr>
+            <a:spLocks noGrp="1"/>
+          </p:cNvSpPr>
+          <p:nvPr>
+            <p:ph type="body" idx="1"/>
+          </p:nvPr>
+        </p:nvSpPr>
+        <p:spPr/>
+        <p:txBody>
+          <a:bodyPr/>
+          <a:lstStyle/>
+          <a:p>
+            <a:r>
+              <a:rPr lang="de-AT" dirty="0" smtClean="0"/>
+              <a:t>Fit </a:t>
+            </a:r>
+            <a:r>
+              <a:rPr lang="de-AT" dirty="0" err="1" smtClean="0"/>
+              <a:t>classifier</a:t>
+            </a:r>
+            <a:r>
+              <a:rPr lang="de-AT" dirty="0" smtClean="0"/>
+              <a:t> </a:t>
+            </a:r>
+            <a:r>
+              <a:rPr lang="de-AT" dirty="0" err="1" smtClean="0"/>
+              <a:t>best</a:t>
+            </a:r>
+            <a:r>
+              <a:rPr lang="de-AT" dirty="0" smtClean="0"/>
+              <a:t> = </a:t>
+            </a:r>
+            <a:r>
+              <a:rPr lang="de-AT" dirty="0" err="1" smtClean="0"/>
+              <a:t>consider</a:t>
+            </a:r>
+            <a:r>
+              <a:rPr lang="de-AT" dirty="0" smtClean="0"/>
+              <a:t> </a:t>
+            </a:r>
+            <a:r>
+              <a:rPr lang="de-AT" dirty="0" err="1" smtClean="0"/>
+              <a:t>biases</a:t>
+            </a:r>
+            <a:r>
+              <a:rPr lang="de-AT" dirty="0" smtClean="0"/>
+              <a:t> </a:t>
+            </a:r>
+            <a:r>
+              <a:rPr lang="de-AT" dirty="0" err="1" smtClean="0"/>
+              <a:t>and</a:t>
+            </a:r>
+            <a:r>
+              <a:rPr lang="de-AT" dirty="0" smtClean="0"/>
+              <a:t> </a:t>
+            </a:r>
+            <a:r>
+              <a:rPr lang="de-AT" dirty="0" err="1" smtClean="0"/>
+              <a:t>heuristics</a:t>
+            </a:r>
+            <a:r>
+              <a:rPr lang="de-AT" dirty="0" smtClean="0"/>
+              <a:t> </a:t>
+            </a:r>
+            <a:r>
+              <a:rPr lang="de-AT" dirty="0" err="1" smtClean="0"/>
+              <a:t>of</a:t>
+            </a:r>
+            <a:r>
+              <a:rPr lang="de-AT" baseline="0" dirty="0" smtClean="0"/>
+              <a:t> a </a:t>
+            </a:r>
+            <a:r>
+              <a:rPr lang="de-AT" baseline="0" dirty="0" err="1" smtClean="0"/>
+              <a:t>classifier</a:t>
+            </a:r>
+            <a:r>
+              <a:rPr lang="de-AT" baseline="0" dirty="0" smtClean="0"/>
+              <a:t> </a:t>
+            </a:r>
+            <a:r>
+              <a:rPr lang="de-AT" baseline="0" dirty="0" err="1" smtClean="0"/>
+              <a:t>optimally</a:t>
+            </a:r>
+            <a:endParaRPr lang="de-AT" dirty="0"/>
+          </a:p>
+        </p:txBody>
+      </p:sp>
+      <p:sp>
+        <p:nvSpPr>
+          <p:cNvPr id="4" name="Foliennummernplatzhalter 3"/>
+          <p:cNvSpPr>
+            <a:spLocks noGrp="1"/>
+          </p:cNvSpPr>
+          <p:nvPr>
+            <p:ph type="sldNum" sz="quarter" idx="10"/>
+          </p:nvPr>
+        </p:nvSpPr>
+        <p:spPr/>
+        <p:txBody>
+          <a:bodyPr/>
+          <a:lstStyle/>
+          <a:p>
+            <a:fld id="{07914D93-ABC8-448C-8296-85FD12164B61}" type="slidenum">
+              <a:rPr lang="de-DE" altLang="de-DE" smtClean="0"/>
+              <a:pPr/>
+              <a:t>13</a:t>
+            </a:fld>
+            <a:endParaRPr lang="de-DE" altLang="de-DE"/>
+          </a:p>
+        </p:txBody>
+      </p:sp>
+    </p:spTree>
+    <p:extLst>
+      <p:ext uri="{BB962C8B-B14F-4D97-AF65-F5344CB8AC3E}">
+        <p14:creationId xmlns:p14="http://schemas.microsoft.com/office/powerpoint/2010/main" val="2492573933"/>
+      </p:ext>
+    </p:extLst>
+  </p:cSld>
+  <p:clrMapOvr>
+    <a:masterClrMapping/>
+  </p:clrMapOvr>
+</p:notes>
+</file>
+
+<file path=ppt/notesSlides/notesSlide7.xml><?xml version="1.0" encoding="utf-8"?>
+<p:notes xmlns:a="http://schemas.openxmlformats.org/drawingml/2006/main" xmlns:r="http://schemas.openxmlformats.org/officeDocument/2006/relationships" xmlns:p="http://schemas.openxmlformats.org/presentationml/2006/main">
+  <p:cSld>
+    <p:spTree>
+      <p:nvGrpSpPr>
+        <p:cNvPr id="1" name=""/>
+        <p:cNvGrpSpPr/>
+        <p:nvPr/>
+      </p:nvGrpSpPr>
+      <p:grpSpPr>
+        <a:xfrm>
+          <a:off x="0" y="0"/>
+          <a:ext cx="0" cy="0"/>
+          <a:chOff x="0" y="0"/>
+          <a:chExt cx="0" cy="0"/>
+        </a:xfrm>
+      </p:grpSpPr>
+      <p:sp>
+        <p:nvSpPr>
+          <p:cNvPr id="2" name="Folienbildplatzhalter 1"/>
+          <p:cNvSpPr>
+            <a:spLocks noGrp="1" noRot="1" noChangeAspect="1"/>
+          </p:cNvSpPr>
+          <p:nvPr>
+            <p:ph type="sldImg"/>
+          </p:nvPr>
+        </p:nvSpPr>
+        <p:spPr/>
+      </p:sp>
+      <p:sp>
+        <p:nvSpPr>
+          <p:cNvPr id="3" name="Notizenplatzhalter 2"/>
+          <p:cNvSpPr>
+            <a:spLocks noGrp="1"/>
+          </p:cNvSpPr>
+          <p:nvPr>
+            <p:ph type="body" idx="1"/>
+          </p:nvPr>
+        </p:nvSpPr>
+        <p:spPr/>
+        <p:txBody>
+          <a:bodyPr/>
+          <a:lstStyle/>
+          <a:p>
+            <a:r>
+              <a:rPr lang="de-AT" dirty="0" smtClean="0"/>
+              <a:t>Search: different </a:t>
+            </a:r>
+            <a:r>
+              <a:rPr lang="de-AT" dirty="0" err="1" smtClean="0"/>
+              <a:t>algorithms</a:t>
+            </a:r>
+            <a:r>
+              <a:rPr lang="de-AT" dirty="0" smtClean="0"/>
+              <a:t> </a:t>
+            </a:r>
+            <a:r>
+              <a:rPr lang="de-AT" dirty="0" err="1" smtClean="0"/>
+              <a:t>possible</a:t>
+            </a:r>
+            <a:endParaRPr lang="de-AT" dirty="0" smtClean="0"/>
+          </a:p>
+          <a:p>
+            <a:r>
+              <a:rPr lang="de-AT" dirty="0" smtClean="0"/>
+              <a:t>Evaluation/</a:t>
+            </a:r>
+            <a:r>
+              <a:rPr lang="de-AT" dirty="0" err="1" smtClean="0"/>
+              <a:t>Estimation</a:t>
+            </a:r>
+            <a:r>
+              <a:rPr lang="de-AT" dirty="0" smtClean="0"/>
+              <a:t>: Test</a:t>
+            </a:r>
+            <a:r>
+              <a:rPr lang="de-AT" baseline="0" dirty="0" smtClean="0"/>
+              <a:t> </a:t>
+            </a:r>
+            <a:r>
+              <a:rPr lang="de-AT" baseline="0" dirty="0" err="1" smtClean="0"/>
+              <a:t>set</a:t>
+            </a:r>
+            <a:r>
+              <a:rPr lang="de-AT" baseline="0" dirty="0" smtClean="0"/>
+              <a:t>, </a:t>
+            </a:r>
+            <a:r>
+              <a:rPr lang="de-AT" baseline="0" dirty="0" err="1" smtClean="0"/>
+              <a:t>cross</a:t>
+            </a:r>
+            <a:r>
+              <a:rPr lang="de-AT" baseline="0" dirty="0" smtClean="0"/>
+              <a:t> </a:t>
+            </a:r>
+            <a:r>
+              <a:rPr lang="de-AT" baseline="0" dirty="0" err="1" smtClean="0"/>
+              <a:t>validation</a:t>
+            </a:r>
+            <a:r>
+              <a:rPr lang="de-AT" baseline="0" dirty="0" smtClean="0"/>
+              <a:t> – </a:t>
+            </a:r>
+            <a:r>
+              <a:rPr lang="de-AT" baseline="0" dirty="0" err="1" smtClean="0"/>
+              <a:t>uses</a:t>
+            </a:r>
+            <a:r>
+              <a:rPr lang="de-AT" baseline="0" dirty="0" smtClean="0"/>
+              <a:t> </a:t>
+            </a:r>
+            <a:r>
+              <a:rPr lang="de-AT" baseline="0" dirty="0" err="1" smtClean="0"/>
+              <a:t>the</a:t>
+            </a:r>
+            <a:r>
+              <a:rPr lang="de-AT" baseline="0" dirty="0" smtClean="0"/>
+              <a:t> </a:t>
+            </a:r>
+            <a:r>
+              <a:rPr lang="de-AT" baseline="0" dirty="0" err="1" smtClean="0"/>
+              <a:t>classifier</a:t>
+            </a:r>
+            <a:endParaRPr lang="de-AT" baseline="0" dirty="0" smtClean="0"/>
+          </a:p>
+          <a:p>
+            <a:pPr marL="0" indent="0">
+              <a:buFont typeface="+mj-lt"/>
+              <a:buNone/>
+            </a:pPr>
+            <a:endParaRPr lang="de-AT" baseline="0" dirty="0" smtClean="0"/>
+          </a:p>
+          <a:p>
+            <a:pPr marL="0" indent="0">
+              <a:buFont typeface="+mj-lt"/>
+              <a:buNone/>
+            </a:pPr>
+            <a:r>
+              <a:rPr lang="de-AT" baseline="0" dirty="0" err="1" smtClean="0"/>
+              <a:t>Finally</a:t>
+            </a:r>
+            <a:r>
+              <a:rPr lang="de-AT" baseline="0" dirty="0" smtClean="0"/>
+              <a:t>: </a:t>
+            </a:r>
+            <a:r>
+              <a:rPr lang="de-AT" dirty="0" err="1" smtClean="0"/>
+              <a:t>Use</a:t>
+            </a:r>
+            <a:r>
+              <a:rPr lang="de-AT" dirty="0" smtClean="0"/>
+              <a:t> </a:t>
+            </a:r>
+            <a:r>
+              <a:rPr lang="de-AT" dirty="0" err="1" smtClean="0"/>
+              <a:t>subset</a:t>
+            </a:r>
+            <a:r>
+              <a:rPr lang="de-AT" dirty="0" smtClean="0"/>
+              <a:t> </a:t>
+            </a:r>
+            <a:r>
+              <a:rPr lang="de-AT" dirty="0" err="1" smtClean="0"/>
+              <a:t>with</a:t>
+            </a:r>
+            <a:r>
+              <a:rPr lang="de-AT" dirty="0" smtClean="0"/>
+              <a:t> </a:t>
+            </a:r>
+            <a:r>
+              <a:rPr lang="de-AT" dirty="0" err="1" smtClean="0"/>
+              <a:t>best</a:t>
+            </a:r>
+            <a:r>
+              <a:rPr lang="de-AT" dirty="0" smtClean="0"/>
+              <a:t> </a:t>
+            </a:r>
+            <a:r>
+              <a:rPr lang="de-AT" dirty="0" err="1" smtClean="0"/>
+              <a:t>performance</a:t>
+            </a:r>
+            <a:r>
+              <a:rPr lang="de-AT" baseline="0" dirty="0" smtClean="0"/>
+              <a:t> </a:t>
+            </a:r>
+            <a:r>
+              <a:rPr lang="de-AT" baseline="0" dirty="0" err="1" smtClean="0"/>
+              <a:t>to</a:t>
+            </a:r>
+            <a:r>
+              <a:rPr lang="de-AT" baseline="0" dirty="0" smtClean="0"/>
+              <a:t> </a:t>
+            </a:r>
+            <a:r>
+              <a:rPr lang="de-AT" baseline="0" dirty="0" err="1" smtClean="0"/>
+              <a:t>train</a:t>
+            </a:r>
+            <a:r>
+              <a:rPr lang="de-AT" baseline="0" dirty="0" smtClean="0"/>
+              <a:t> </a:t>
+            </a:r>
+            <a:r>
+              <a:rPr lang="de-AT" baseline="0" dirty="0" err="1" smtClean="0"/>
+              <a:t>classifier</a:t>
+            </a:r>
+            <a:r>
+              <a:rPr lang="de-AT" baseline="0" dirty="0" smtClean="0"/>
+              <a:t>,  </a:t>
+            </a:r>
+            <a:r>
+              <a:rPr lang="de-AT" baseline="0" dirty="0" err="1" smtClean="0"/>
+              <a:t>and</a:t>
+            </a:r>
+            <a:r>
+              <a:rPr lang="de-AT" baseline="0" dirty="0" smtClean="0"/>
+              <a:t>   </a:t>
+            </a:r>
+            <a:r>
+              <a:rPr lang="de-AT" baseline="0" dirty="0" err="1" smtClean="0"/>
+              <a:t>use</a:t>
+            </a:r>
+            <a:r>
+              <a:rPr lang="de-AT" baseline="0" dirty="0" smtClean="0"/>
+              <a:t> </a:t>
+            </a:r>
+            <a:r>
+              <a:rPr lang="de-AT" baseline="0" dirty="0" err="1" smtClean="0"/>
+              <a:t>it</a:t>
+            </a:r>
+            <a:r>
+              <a:rPr lang="de-AT" baseline="0" dirty="0" smtClean="0"/>
+              <a:t>  </a:t>
+            </a:r>
+            <a:r>
+              <a:rPr lang="de-AT" baseline="0" dirty="0" err="1" smtClean="0"/>
+              <a:t>for</a:t>
+            </a:r>
+            <a:r>
+              <a:rPr lang="de-AT" baseline="0" dirty="0" smtClean="0"/>
+              <a:t> </a:t>
+            </a:r>
+            <a:r>
+              <a:rPr lang="de-AT" baseline="0" dirty="0" err="1" smtClean="0"/>
+              <a:t>actual</a:t>
+            </a:r>
+            <a:r>
+              <a:rPr lang="de-AT" baseline="0" dirty="0" smtClean="0"/>
+              <a:t> </a:t>
+            </a:r>
+            <a:r>
+              <a:rPr lang="de-AT" dirty="0" err="1" smtClean="0"/>
+              <a:t>classification</a:t>
+            </a:r>
+            <a:r>
+              <a:rPr lang="de-AT" dirty="0" smtClean="0"/>
+              <a:t> </a:t>
+            </a:r>
+            <a:r>
+              <a:rPr lang="de-AT" dirty="0" err="1" smtClean="0"/>
+              <a:t>task</a:t>
+            </a:r>
+            <a:r>
+              <a:rPr lang="de-AT" dirty="0" smtClean="0"/>
+              <a:t> (</a:t>
+            </a:r>
+            <a:r>
+              <a:rPr lang="de-AT" dirty="0" err="1" smtClean="0"/>
+              <a:t>normally</a:t>
+            </a:r>
+            <a:r>
+              <a:rPr lang="de-AT" dirty="0" smtClean="0"/>
+              <a:t> after </a:t>
+            </a:r>
+            <a:r>
+              <a:rPr lang="de-AT" dirty="0" err="1" smtClean="0"/>
+              <a:t>testing</a:t>
+            </a:r>
+            <a:r>
+              <a:rPr lang="de-AT" baseline="0" dirty="0" smtClean="0"/>
+              <a:t> </a:t>
+            </a:r>
+            <a:r>
+              <a:rPr lang="de-AT" baseline="0" dirty="0" err="1" smtClean="0"/>
+              <a:t>with</a:t>
+            </a:r>
+            <a:r>
+              <a:rPr lang="de-AT" baseline="0" dirty="0" smtClean="0"/>
+              <a:t> </a:t>
+            </a:r>
+            <a:r>
+              <a:rPr lang="de-AT" baseline="0" dirty="0" err="1" smtClean="0"/>
+              <a:t>testset</a:t>
+            </a:r>
+            <a:r>
+              <a:rPr lang="de-AT" baseline="0" dirty="0" smtClean="0"/>
+              <a:t> </a:t>
+            </a:r>
+            <a:r>
+              <a:rPr lang="de-AT" baseline="0" dirty="0" err="1" smtClean="0"/>
+              <a:t>independent</a:t>
+            </a:r>
+            <a:r>
+              <a:rPr lang="de-AT" baseline="0" dirty="0" smtClean="0"/>
+              <a:t> </a:t>
+            </a:r>
+            <a:r>
+              <a:rPr lang="de-AT" baseline="0" dirty="0" err="1" smtClean="0"/>
+              <a:t>from</a:t>
+            </a:r>
+            <a:r>
+              <a:rPr lang="de-AT" baseline="0" dirty="0" smtClean="0"/>
+              <a:t> </a:t>
+            </a:r>
+            <a:r>
+              <a:rPr lang="de-AT" baseline="0" dirty="0" err="1" smtClean="0"/>
+              <a:t>training</a:t>
+            </a:r>
+            <a:r>
+              <a:rPr lang="de-AT" baseline="0" dirty="0" smtClean="0"/>
+              <a:t> </a:t>
+            </a:r>
+            <a:r>
+              <a:rPr lang="de-AT" baseline="0" dirty="0" err="1" smtClean="0"/>
+              <a:t>set</a:t>
+            </a:r>
+            <a:r>
+              <a:rPr lang="de-AT" baseline="0" dirty="0" smtClean="0"/>
+              <a:t>)</a:t>
+            </a:r>
+            <a:endParaRPr lang="de-AT" dirty="0" smtClean="0"/>
+          </a:p>
+          <a:p>
+            <a:endParaRPr lang="de-AT" dirty="0"/>
+          </a:p>
+        </p:txBody>
+      </p:sp>
+      <p:sp>
+        <p:nvSpPr>
+          <p:cNvPr id="4" name="Foliennummernplatzhalter 3"/>
+          <p:cNvSpPr>
+            <a:spLocks noGrp="1"/>
+          </p:cNvSpPr>
+          <p:nvPr>
+            <p:ph type="sldNum" sz="quarter" idx="10"/>
+          </p:nvPr>
+        </p:nvSpPr>
+        <p:spPr/>
+        <p:txBody>
+          <a:bodyPr/>
+          <a:lstStyle/>
+          <a:p>
+            <a:fld id="{07914D93-ABC8-448C-8296-85FD12164B61}" type="slidenum">
+              <a:rPr lang="de-DE" altLang="de-DE" smtClean="0"/>
+              <a:pPr/>
+              <a:t>14</a:t>
+            </a:fld>
+            <a:endParaRPr lang="de-DE" altLang="de-DE"/>
+          </a:p>
+        </p:txBody>
+      </p:sp>
+    </p:spTree>
+    <p:extLst>
+      <p:ext uri="{BB962C8B-B14F-4D97-AF65-F5344CB8AC3E}">
+        <p14:creationId xmlns:p14="http://schemas.microsoft.com/office/powerpoint/2010/main" val="2073029618"/>
+      </p:ext>
+    </p:extLst>
+  </p:cSld>
+  <p:clrMapOvr>
+    <a:masterClrMapping/>
+  </p:clrMapOvr>
+</p:notes>
+</file>
+
+<file path=ppt/notesSlides/notesSlide8.xml><?xml version="1.0" encoding="utf-8"?>
+<p:notes xmlns:a="http://schemas.openxmlformats.org/drawingml/2006/main" xmlns:r="http://schemas.openxmlformats.org/officeDocument/2006/relationships" xmlns:p="http://schemas.openxmlformats.org/presentationml/2006/main">
+  <p:cSld>
+    <p:spTree>
+      <p:nvGrpSpPr>
+        <p:cNvPr id="1" name=""/>
+        <p:cNvGrpSpPr/>
+        <p:nvPr/>
+      </p:nvGrpSpPr>
+      <p:grpSpPr>
+        <a:xfrm>
+          <a:off x="0" y="0"/>
+          <a:ext cx="0" cy="0"/>
+          <a:chOff x="0" y="0"/>
+          <a:chExt cx="0" cy="0"/>
+        </a:xfrm>
+      </p:grpSpPr>
+      <p:sp>
+        <p:nvSpPr>
+          <p:cNvPr id="2" name="Folienbildplatzhalter 1"/>
+          <p:cNvSpPr>
+            <a:spLocks noGrp="1" noRot="1" noChangeAspect="1"/>
+          </p:cNvSpPr>
+          <p:nvPr>
+            <p:ph type="sldImg"/>
+          </p:nvPr>
+        </p:nvSpPr>
+        <p:spPr/>
+      </p:sp>
+      <p:sp>
+        <p:nvSpPr>
+          <p:cNvPr id="3" name="Notizenplatzhalter 2"/>
+          <p:cNvSpPr>
+            <a:spLocks noGrp="1"/>
+          </p:cNvSpPr>
+          <p:nvPr>
+            <p:ph type="body" idx="1"/>
+          </p:nvPr>
+        </p:nvSpPr>
+        <p:spPr/>
+        <p:txBody>
+          <a:bodyPr/>
+          <a:lstStyle/>
+          <a:p>
+            <a:r>
+              <a:rPr lang="de-AT" dirty="0" smtClean="0"/>
+              <a:t>Search: different </a:t>
+            </a:r>
+            <a:r>
+              <a:rPr lang="de-AT" dirty="0" err="1" smtClean="0"/>
+              <a:t>algorithms</a:t>
+            </a:r>
+            <a:r>
+              <a:rPr lang="de-AT" dirty="0" smtClean="0"/>
+              <a:t> </a:t>
+            </a:r>
+            <a:r>
+              <a:rPr lang="de-AT" dirty="0" err="1" smtClean="0"/>
+              <a:t>possible</a:t>
+            </a:r>
+            <a:endParaRPr lang="de-AT" dirty="0" smtClean="0"/>
+          </a:p>
+          <a:p>
+            <a:r>
+              <a:rPr lang="de-AT" dirty="0" smtClean="0"/>
+              <a:t>Evaluation/</a:t>
+            </a:r>
+            <a:r>
+              <a:rPr lang="de-AT" dirty="0" err="1" smtClean="0"/>
+              <a:t>Estimation</a:t>
+            </a:r>
+            <a:r>
+              <a:rPr lang="de-AT" dirty="0" smtClean="0"/>
+              <a:t>: Test</a:t>
+            </a:r>
+            <a:r>
+              <a:rPr lang="de-AT" baseline="0" dirty="0" smtClean="0"/>
+              <a:t> </a:t>
+            </a:r>
+            <a:r>
+              <a:rPr lang="de-AT" baseline="0" dirty="0" err="1" smtClean="0"/>
+              <a:t>set</a:t>
+            </a:r>
+            <a:r>
+              <a:rPr lang="de-AT" baseline="0" dirty="0" smtClean="0"/>
+              <a:t>, </a:t>
+            </a:r>
+            <a:r>
+              <a:rPr lang="de-AT" baseline="0" dirty="0" err="1" smtClean="0"/>
+              <a:t>cross</a:t>
+            </a:r>
+            <a:r>
+              <a:rPr lang="de-AT" baseline="0" dirty="0" smtClean="0"/>
+              <a:t> </a:t>
+            </a:r>
+            <a:r>
+              <a:rPr lang="de-AT" baseline="0" dirty="0" err="1" smtClean="0"/>
+              <a:t>validation</a:t>
+            </a:r>
+            <a:r>
+              <a:rPr lang="de-AT" baseline="0" dirty="0" smtClean="0"/>
+              <a:t> – </a:t>
+            </a:r>
+            <a:r>
+              <a:rPr lang="de-AT" baseline="0" dirty="0" err="1" smtClean="0"/>
+              <a:t>uses</a:t>
+            </a:r>
+            <a:r>
+              <a:rPr lang="de-AT" baseline="0" dirty="0" smtClean="0"/>
+              <a:t> </a:t>
+            </a:r>
+            <a:r>
+              <a:rPr lang="de-AT" baseline="0" dirty="0" err="1" smtClean="0"/>
+              <a:t>the</a:t>
+            </a:r>
+            <a:r>
+              <a:rPr lang="de-AT" baseline="0" dirty="0" smtClean="0"/>
+              <a:t> </a:t>
+            </a:r>
+            <a:r>
+              <a:rPr lang="de-AT" baseline="0" dirty="0" err="1" smtClean="0"/>
+              <a:t>classifier</a:t>
+            </a:r>
+            <a:endParaRPr lang="de-AT" baseline="0" dirty="0" smtClean="0"/>
+          </a:p>
+          <a:p>
+            <a:pPr marL="0" indent="0">
+              <a:buFont typeface="+mj-lt"/>
+              <a:buNone/>
+            </a:pPr>
+            <a:endParaRPr lang="de-AT" baseline="0" dirty="0" smtClean="0"/>
+          </a:p>
+          <a:p>
+            <a:pPr marL="0" indent="0">
+              <a:buFont typeface="+mj-lt"/>
+              <a:buNone/>
+            </a:pPr>
+            <a:r>
+              <a:rPr lang="de-AT" baseline="0" dirty="0" err="1" smtClean="0"/>
+              <a:t>Finally</a:t>
+            </a:r>
+            <a:r>
+              <a:rPr lang="de-AT" baseline="0" dirty="0" smtClean="0"/>
+              <a:t>: </a:t>
+            </a:r>
+            <a:r>
+              <a:rPr lang="de-AT" dirty="0" err="1" smtClean="0"/>
+              <a:t>Use</a:t>
+            </a:r>
+            <a:r>
+              <a:rPr lang="de-AT" dirty="0" smtClean="0"/>
+              <a:t> </a:t>
+            </a:r>
+            <a:r>
+              <a:rPr lang="de-AT" dirty="0" err="1" smtClean="0"/>
+              <a:t>subset</a:t>
+            </a:r>
+            <a:r>
+              <a:rPr lang="de-AT" dirty="0" smtClean="0"/>
+              <a:t> </a:t>
+            </a:r>
+            <a:r>
+              <a:rPr lang="de-AT" dirty="0" err="1" smtClean="0"/>
+              <a:t>with</a:t>
+            </a:r>
+            <a:r>
+              <a:rPr lang="de-AT" dirty="0" smtClean="0"/>
+              <a:t> </a:t>
+            </a:r>
+            <a:r>
+              <a:rPr lang="de-AT" dirty="0" err="1" smtClean="0"/>
+              <a:t>best</a:t>
+            </a:r>
+            <a:r>
+              <a:rPr lang="de-AT" dirty="0" smtClean="0"/>
+              <a:t> </a:t>
+            </a:r>
+            <a:r>
+              <a:rPr lang="de-AT" dirty="0" err="1" smtClean="0"/>
+              <a:t>performance</a:t>
+            </a:r>
+            <a:r>
+              <a:rPr lang="de-AT" baseline="0" dirty="0" smtClean="0"/>
+              <a:t> </a:t>
+            </a:r>
+            <a:r>
+              <a:rPr lang="de-AT" baseline="0" dirty="0" err="1" smtClean="0"/>
+              <a:t>to</a:t>
+            </a:r>
+            <a:r>
+              <a:rPr lang="de-AT" baseline="0" dirty="0" smtClean="0"/>
+              <a:t> </a:t>
+            </a:r>
+            <a:r>
+              <a:rPr lang="de-AT" baseline="0" dirty="0" err="1" smtClean="0"/>
+              <a:t>train</a:t>
+            </a:r>
+            <a:r>
+              <a:rPr lang="de-AT" baseline="0" dirty="0" smtClean="0"/>
+              <a:t> </a:t>
+            </a:r>
+            <a:r>
+              <a:rPr lang="de-AT" baseline="0" dirty="0" err="1" smtClean="0"/>
+              <a:t>classifier</a:t>
+            </a:r>
+            <a:r>
+              <a:rPr lang="de-AT" baseline="0" dirty="0" smtClean="0"/>
+              <a:t>,  </a:t>
+            </a:r>
+            <a:r>
+              <a:rPr lang="de-AT" baseline="0" dirty="0" err="1" smtClean="0"/>
+              <a:t>and</a:t>
+            </a:r>
+            <a:r>
+              <a:rPr lang="de-AT" baseline="0" dirty="0" smtClean="0"/>
+              <a:t>   </a:t>
+            </a:r>
+            <a:r>
+              <a:rPr lang="de-AT" baseline="0" dirty="0" err="1" smtClean="0"/>
+              <a:t>use</a:t>
+            </a:r>
+            <a:r>
+              <a:rPr lang="de-AT" baseline="0" dirty="0" smtClean="0"/>
+              <a:t> </a:t>
+            </a:r>
+            <a:r>
+              <a:rPr lang="de-AT" baseline="0" dirty="0" err="1" smtClean="0"/>
+              <a:t>it</a:t>
+            </a:r>
+            <a:r>
+              <a:rPr lang="de-AT" baseline="0" dirty="0" smtClean="0"/>
+              <a:t>  </a:t>
+            </a:r>
+            <a:r>
+              <a:rPr lang="de-AT" baseline="0" dirty="0" err="1" smtClean="0"/>
+              <a:t>for</a:t>
+            </a:r>
+            <a:r>
+              <a:rPr lang="de-AT" baseline="0" dirty="0" smtClean="0"/>
+              <a:t> </a:t>
+            </a:r>
+            <a:r>
+              <a:rPr lang="de-AT" baseline="0" dirty="0" err="1" smtClean="0"/>
+              <a:t>actual</a:t>
+            </a:r>
+            <a:r>
+              <a:rPr lang="de-AT" baseline="0" dirty="0" smtClean="0"/>
+              <a:t> </a:t>
+            </a:r>
+            <a:r>
+              <a:rPr lang="de-AT" dirty="0" err="1" smtClean="0"/>
+              <a:t>classification</a:t>
+            </a:r>
+            <a:r>
+              <a:rPr lang="de-AT" dirty="0" smtClean="0"/>
+              <a:t> </a:t>
+            </a:r>
+            <a:r>
+              <a:rPr lang="de-AT" dirty="0" err="1" smtClean="0"/>
+              <a:t>task</a:t>
+            </a:r>
+            <a:r>
+              <a:rPr lang="de-AT" dirty="0" smtClean="0"/>
+              <a:t> (</a:t>
+            </a:r>
+            <a:r>
+              <a:rPr lang="de-AT" dirty="0" err="1" smtClean="0"/>
+              <a:t>normally</a:t>
+            </a:r>
+            <a:r>
+              <a:rPr lang="de-AT" dirty="0" smtClean="0"/>
+              <a:t> after </a:t>
+            </a:r>
+            <a:r>
+              <a:rPr lang="de-AT" dirty="0" err="1" smtClean="0"/>
+              <a:t>testing</a:t>
+            </a:r>
+            <a:r>
+              <a:rPr lang="de-AT" baseline="0" dirty="0" smtClean="0"/>
+              <a:t> </a:t>
+            </a:r>
+            <a:r>
+              <a:rPr lang="de-AT" baseline="0" dirty="0" err="1" smtClean="0"/>
+              <a:t>with</a:t>
+            </a:r>
+            <a:r>
+              <a:rPr lang="de-AT" baseline="0" dirty="0" smtClean="0"/>
+              <a:t> </a:t>
+            </a:r>
+            <a:r>
+              <a:rPr lang="de-AT" baseline="0" dirty="0" err="1" smtClean="0"/>
+              <a:t>testset</a:t>
+            </a:r>
+            <a:r>
+              <a:rPr lang="de-AT" baseline="0" dirty="0" smtClean="0"/>
+              <a:t> </a:t>
+            </a:r>
+            <a:r>
+              <a:rPr lang="de-AT" baseline="0" dirty="0" err="1" smtClean="0"/>
+              <a:t>independent</a:t>
+            </a:r>
+            <a:r>
+              <a:rPr lang="de-AT" baseline="0" dirty="0" smtClean="0"/>
+              <a:t> </a:t>
+            </a:r>
+            <a:r>
+              <a:rPr lang="de-AT" baseline="0" dirty="0" err="1" smtClean="0"/>
+              <a:t>from</a:t>
+            </a:r>
+            <a:r>
+              <a:rPr lang="de-AT" baseline="0" dirty="0" smtClean="0"/>
+              <a:t> </a:t>
+            </a:r>
+            <a:r>
+              <a:rPr lang="de-AT" baseline="0" dirty="0" err="1" smtClean="0"/>
+              <a:t>training</a:t>
+            </a:r>
+            <a:r>
+              <a:rPr lang="de-AT" baseline="0" dirty="0" smtClean="0"/>
+              <a:t> </a:t>
+            </a:r>
+            <a:r>
+              <a:rPr lang="de-AT" baseline="0" dirty="0" err="1" smtClean="0"/>
+              <a:t>set</a:t>
+            </a:r>
+            <a:r>
+              <a:rPr lang="de-AT" baseline="0" dirty="0" smtClean="0"/>
+              <a:t>)</a:t>
+            </a:r>
+            <a:endParaRPr lang="de-AT" dirty="0" smtClean="0"/>
+          </a:p>
+          <a:p>
+            <a:endParaRPr lang="de-AT" dirty="0"/>
+          </a:p>
+        </p:txBody>
+      </p:sp>
+      <p:sp>
+        <p:nvSpPr>
+          <p:cNvPr id="4" name="Foliennummernplatzhalter 3"/>
+          <p:cNvSpPr>
+            <a:spLocks noGrp="1"/>
+          </p:cNvSpPr>
+          <p:nvPr>
+            <p:ph type="sldNum" sz="quarter" idx="10"/>
+          </p:nvPr>
+        </p:nvSpPr>
+        <p:spPr/>
+        <p:txBody>
+          <a:bodyPr/>
+          <a:lstStyle/>
+          <a:p>
+            <a:fld id="{07914D93-ABC8-448C-8296-85FD12164B61}" type="slidenum">
+              <a:rPr lang="de-DE" altLang="de-DE" smtClean="0"/>
+              <a:pPr/>
+              <a:t>15</a:t>
+            </a:fld>
+            <a:endParaRPr lang="de-DE" altLang="de-DE"/>
+          </a:p>
+        </p:txBody>
+      </p:sp>
+    </p:spTree>
+    <p:extLst>
+      <p:ext uri="{BB962C8B-B14F-4D97-AF65-F5344CB8AC3E}">
+        <p14:creationId xmlns:p14="http://schemas.microsoft.com/office/powerpoint/2010/main" val="2393854123"/>
       </p:ext>
     </p:extLst>
   </p:cSld>
@@ -5338,7 +6605,6 @@
               <a:rPr lang="de-DE" altLang="de-DE" dirty="0" smtClean="0"/>
               <a:t> &amp; Florian Schober</a:t>
             </a:r>
-            <a:endParaRPr lang="de-DE" altLang="de-DE" dirty="0" smtClean="0"/>
           </a:p>
         </p:txBody>
       </p:sp>
@@ -5627,7 +6893,7 @@
           <p:nvPr/>
         </p:nvPicPr>
         <p:blipFill>
-          <a:blip r:embed="rId2">
+          <a:blip r:embed="rId3">
             <a:extLst>
               <a:ext uri="{28A0092B-C50C-407E-A947-70E740481C1C}">
                 <a14:useLocalDpi xmlns:a14="http://schemas.microsoft.com/office/drawing/2010/main" val="0"/>
@@ -5698,7 +6964,7 @@
       </p:grpSpPr>
       <p:sp>
         <p:nvSpPr>
-          <p:cNvPr id="5" name="Titel 4"/>
+          <p:cNvPr id="8" name="Titel 7"/>
           <p:cNvSpPr>
             <a:spLocks noGrp="1"/>
           </p:cNvSpPr>
@@ -5713,7 +6979,7 @@
           <a:p>
             <a:r>
               <a:rPr lang="de-AT" dirty="0" smtClean="0"/>
-              <a:t>Wrapper </a:t>
+              <a:t>Filter </a:t>
             </a:r>
             <a:r>
               <a:rPr lang="de-AT" dirty="0" err="1" smtClean="0"/>
@@ -5725,7 +6991,7 @@
       </p:sp>
       <p:sp>
         <p:nvSpPr>
-          <p:cNvPr id="6" name="Inhaltsplatzhalter 5"/>
+          <p:cNvPr id="9" name="Inhaltsplatzhalter 8"/>
           <p:cNvSpPr>
             <a:spLocks noGrp="1"/>
           </p:cNvSpPr>
@@ -5738,13 +7004,32 @@
           <a:bodyPr/>
           <a:lstStyle/>
           <a:p>
-            <a:pPr>
-              <a:buFont typeface="Arial" panose="020B0604020202020204" pitchFamily="34" charset="0"/>
-              <a:buChar char="•"/>
+            <a:pPr marL="457200" indent="-457200">
+              <a:buFont typeface="+mj-lt"/>
+              <a:buAutoNum type="arabicPeriod"/>
             </a:pPr>
             <a:r>
-              <a:rPr lang="de-AT" dirty="0" err="1" smtClean="0"/>
-              <a:t>Consider</a:t>
+              <a:rPr lang="de-AT" dirty="0" smtClean="0"/>
+              <a:t>Rank </a:t>
+            </a:r>
+            <a:r>
+              <a:rPr lang="de-AT" dirty="0" err="1" smtClean="0"/>
+              <a:t>features</a:t>
+            </a:r>
+            <a:endParaRPr lang="de-AT" dirty="0"/>
+          </a:p>
+          <a:p>
+            <a:pPr marL="457200" indent="-457200">
+              <a:buFont typeface="+mj-lt"/>
+              <a:buAutoNum type="arabicPeriod"/>
+            </a:pPr>
+            <a:r>
+              <a:rPr lang="de-AT" dirty="0" smtClean="0"/>
+              <a:t>Chose </a:t>
+            </a:r>
+            <a:r>
+              <a:rPr lang="de-AT" dirty="0" err="1" smtClean="0"/>
+              <a:t>features</a:t>
             </a:r>
             <a:r>
               <a:rPr lang="de-AT" dirty="0" smtClean="0"/>
@@ -5752,6 +7037,41 @@
             </a:r>
             <a:r>
               <a:rPr lang="de-AT" dirty="0" err="1" smtClean="0"/>
+              <a:t>with</a:t>
+            </a:r>
+            <a:r>
+              <a:rPr lang="de-AT" dirty="0" smtClean="0"/>
+              <a:t> </a:t>
+            </a:r>
+            <a:r>
+              <a:rPr lang="de-AT" dirty="0" err="1" smtClean="0"/>
+              <a:t>highest</a:t>
+            </a:r>
+            <a:r>
+              <a:rPr lang="de-AT" dirty="0" smtClean="0"/>
+              <a:t> </a:t>
+            </a:r>
+            <a:r>
+              <a:rPr lang="de-AT" dirty="0" err="1" smtClean="0"/>
+              <a:t>rankings</a:t>
+            </a:r>
+            <a:r>
+              <a:rPr lang="de-AT" dirty="0" smtClean="0"/>
+              <a:t>,</a:t>
+            </a:r>
+            <a:br>
+              <a:rPr lang="de-AT" dirty="0" smtClean="0"/>
+            </a:br>
+            <a:r>
+              <a:rPr lang="de-AT" dirty="0" err="1" smtClean="0"/>
+              <a:t>induce</a:t>
+            </a:r>
+            <a:r>
+              <a:rPr lang="de-AT" dirty="0" smtClean="0"/>
+              <a:t> </a:t>
+            </a:r>
+            <a:r>
+              <a:rPr lang="de-AT" dirty="0" err="1" smtClean="0"/>
               <a:t>classification</a:t>
             </a:r>
             <a:r>
@@ -5760,46 +7080,7 @@
             </a:r>
             <a:r>
               <a:rPr lang="de-AT" dirty="0" err="1" smtClean="0"/>
-              <a:t>algortihm</a:t>
-            </a:r>
-            <a:endParaRPr lang="de-AT" dirty="0" smtClean="0"/>
-          </a:p>
-          <a:p>
-            <a:pPr>
-              <a:buFont typeface="Arial" panose="020B0604020202020204" pitchFamily="34" charset="0"/>
-              <a:buChar char="•"/>
-            </a:pPr>
-            <a:r>
-              <a:rPr lang="de-AT" dirty="0" smtClean="0"/>
-              <a:t>Select </a:t>
-            </a:r>
-            <a:r>
-              <a:rPr lang="de-AT" dirty="0" err="1" smtClean="0"/>
-              <a:t>features</a:t>
-            </a:r>
-            <a:r>
-              <a:rPr lang="de-AT" dirty="0" smtClean="0"/>
-              <a:t> </a:t>
-            </a:r>
-            <a:r>
-              <a:rPr lang="de-AT" dirty="0" err="1" smtClean="0"/>
-              <a:t>that</a:t>
-            </a:r>
-            <a:r>
-              <a:rPr lang="de-AT" dirty="0" smtClean="0"/>
-              <a:t> fit </a:t>
-            </a:r>
-            <a:r>
-              <a:rPr lang="de-AT" dirty="0" err="1" smtClean="0"/>
-              <a:t>classifier</a:t>
-            </a:r>
-            <a:r>
-              <a:rPr lang="de-AT" dirty="0" smtClean="0"/>
-              <a:t> </a:t>
-            </a:r>
-            <a:r>
-              <a:rPr lang="de-AT" dirty="0" err="1" smtClean="0"/>
-              <a:t>best</a:t>
+              <a:t>models</a:t>
             </a:r>
             <a:endParaRPr lang="de-AT" dirty="0" smtClean="0"/>
           </a:p>
@@ -5811,21 +7092,496 @@
             <a:endParaRPr lang="de-AT" dirty="0"/>
           </a:p>
           <a:p>
+            <a:pPr marL="0" indent="0"/>
+            <a:endParaRPr lang="de-AT" dirty="0"/>
+          </a:p>
+        </p:txBody>
+      </p:sp>
+      <p:sp>
+        <p:nvSpPr>
+          <p:cNvPr id="5" name="Datumsplatzhalter 4"/>
+          <p:cNvSpPr>
+            <a:spLocks noGrp="1"/>
+          </p:cNvSpPr>
+          <p:nvPr>
+            <p:ph type="dt" sz="half" idx="10"/>
+          </p:nvPr>
+        </p:nvSpPr>
+        <p:spPr/>
+        <p:txBody>
+          <a:bodyPr/>
+          <a:lstStyle/>
+          <a:p>
+            <a:pPr>
+              <a:defRPr/>
+            </a:pPr>
+            <a:fld id="{F730624D-5A85-4FAC-A8C2-B755D15BE30C}" type="datetime1">
+              <a:rPr lang="de-AT" smtClean="0"/>
+              <a:t>25.01.2016</a:t>
+            </a:fld>
+            <a:endParaRPr lang="de-DE" dirty="0"/>
+          </a:p>
+        </p:txBody>
+      </p:sp>
+      <p:sp>
+        <p:nvSpPr>
+          <p:cNvPr id="6" name="Fußzeilenplatzhalter 5"/>
+          <p:cNvSpPr>
+            <a:spLocks noGrp="1"/>
+          </p:cNvSpPr>
+          <p:nvPr>
+            <p:ph type="ftr" sz="quarter" idx="11"/>
+          </p:nvPr>
+        </p:nvSpPr>
+        <p:spPr/>
+        <p:txBody>
+          <a:bodyPr/>
+          <a:lstStyle/>
+          <a:p>
+            <a:pPr>
+              <a:defRPr/>
+            </a:pPr>
+            <a:r>
+              <a:rPr lang="de-DE" smtClean="0"/>
+              <a:t>Silvana Podaras &amp; Florian Schober</a:t>
+            </a:r>
+            <a:endParaRPr lang="de-DE"/>
+          </a:p>
+        </p:txBody>
+      </p:sp>
+      <p:sp>
+        <p:nvSpPr>
+          <p:cNvPr id="7" name="Foliennummernplatzhalter 6"/>
+          <p:cNvSpPr>
+            <a:spLocks noGrp="1"/>
+          </p:cNvSpPr>
+          <p:nvPr>
+            <p:ph type="sldNum" sz="quarter" idx="12"/>
+          </p:nvPr>
+        </p:nvSpPr>
+        <p:spPr/>
+        <p:txBody>
+          <a:bodyPr/>
+          <a:lstStyle/>
+          <a:p>
+            <a:fld id="{E7C81DBF-6C1A-4CEB-BBA0-5651AFB5C718}" type="slidenum">
+              <a:rPr lang="de-DE" altLang="de-DE" smtClean="0"/>
+              <a:pPr/>
+              <a:t>11</a:t>
+            </a:fld>
+            <a:endParaRPr lang="de-DE" altLang="de-DE"/>
+          </a:p>
+        </p:txBody>
+      </p:sp>
+    </p:spTree>
+    <p:extLst>
+      <p:ext uri="{BB962C8B-B14F-4D97-AF65-F5344CB8AC3E}">
+        <p14:creationId xmlns:p14="http://schemas.microsoft.com/office/powerpoint/2010/main" val="1402256125"/>
+      </p:ext>
+    </p:extLst>
+  </p:cSld>
+  <p:clrMapOvr>
+    <a:masterClrMapping/>
+  </p:clrMapOvr>
+</p:sld>
+</file>
+
+<file path=ppt/slides/slide12.xml><?xml version="1.0" encoding="utf-8"?>
+<p:sld xmlns:a="http://schemas.openxmlformats.org/drawingml/2006/main" xmlns:r="http://schemas.openxmlformats.org/officeDocument/2006/relationships" xmlns:p="http://schemas.openxmlformats.org/presentationml/2006/main">
+  <p:cSld>
+    <p:spTree>
+      <p:nvGrpSpPr>
+        <p:cNvPr id="1" name=""/>
+        <p:cNvGrpSpPr/>
+        <p:nvPr/>
+      </p:nvGrpSpPr>
+      <p:grpSpPr>
+        <a:xfrm>
+          <a:off x="0" y="0"/>
+          <a:ext cx="0" cy="0"/>
+          <a:chOff x="0" y="0"/>
+          <a:chExt cx="0" cy="0"/>
+        </a:xfrm>
+      </p:grpSpPr>
+      <p:sp>
+        <p:nvSpPr>
+          <p:cNvPr id="8" name="Titel 7"/>
+          <p:cNvSpPr>
+            <a:spLocks noGrp="1"/>
+          </p:cNvSpPr>
+          <p:nvPr>
+            <p:ph type="title"/>
+          </p:nvPr>
+        </p:nvSpPr>
+        <p:spPr/>
+        <p:txBody>
+          <a:bodyPr/>
+          <a:lstStyle/>
+          <a:p>
+            <a:r>
+              <a:rPr lang="de-AT" dirty="0" err="1" smtClean="0"/>
+              <a:t>Example</a:t>
+            </a:r>
+            <a:r>
+              <a:rPr lang="de-AT" dirty="0" smtClean="0"/>
+              <a:t>: RELIEF</a:t>
+            </a:r>
+            <a:endParaRPr lang="de-AT" dirty="0"/>
+          </a:p>
+        </p:txBody>
+      </p:sp>
+      <p:sp>
+        <p:nvSpPr>
+          <p:cNvPr id="9" name="Inhaltsplatzhalter 8"/>
+          <p:cNvSpPr>
+            <a:spLocks noGrp="1"/>
+          </p:cNvSpPr>
+          <p:nvPr>
+            <p:ph idx="1"/>
+          </p:nvPr>
+        </p:nvSpPr>
+        <p:spPr/>
+        <p:txBody>
+          <a:bodyPr/>
+          <a:lstStyle/>
+          <a:p>
+            <a:pPr marL="457200" indent="-457200">
+              <a:buFont typeface="+mj-lt"/>
+              <a:buAutoNum type="arabicPeriod"/>
+            </a:pPr>
+            <a:r>
+              <a:rPr lang="de-AT" dirty="0" smtClean="0"/>
+              <a:t>Binary </a:t>
+            </a:r>
+            <a:r>
+              <a:rPr lang="de-AT" dirty="0" err="1" smtClean="0"/>
+              <a:t>classification</a:t>
+            </a:r>
+            <a:endParaRPr lang="de-AT" dirty="0" smtClean="0"/>
+          </a:p>
+          <a:p>
+            <a:pPr marL="457200" indent="-457200">
+              <a:buFont typeface="+mj-lt"/>
+              <a:buAutoNum type="arabicPeriod"/>
+            </a:pPr>
+            <a:r>
+              <a:rPr lang="de-AT" dirty="0" err="1" smtClean="0"/>
+              <a:t>Represent</a:t>
+            </a:r>
+            <a:r>
+              <a:rPr lang="de-AT" dirty="0" smtClean="0"/>
+              <a:t> </a:t>
+            </a:r>
+            <a:r>
+              <a:rPr lang="de-AT" dirty="0" err="1" smtClean="0"/>
+              <a:t>features</a:t>
+            </a:r>
+            <a:r>
+              <a:rPr lang="de-AT" dirty="0" smtClean="0"/>
+              <a:t> </a:t>
+            </a:r>
+            <a:r>
+              <a:rPr lang="de-AT" dirty="0" err="1" smtClean="0"/>
+              <a:t>by</a:t>
+            </a:r>
+            <a:r>
+              <a:rPr lang="de-AT" dirty="0" smtClean="0"/>
+              <a:t> </a:t>
+            </a:r>
+            <a:r>
+              <a:rPr lang="de-AT" dirty="0" err="1" smtClean="0"/>
+              <a:t>weights</a:t>
+            </a:r>
+            <a:r>
+              <a:rPr lang="de-AT" dirty="0" smtClean="0"/>
+              <a:t> in a </a:t>
+            </a:r>
+            <a:r>
+              <a:rPr lang="de-AT" dirty="0" err="1" smtClean="0"/>
+              <a:t>vector</a:t>
+            </a:r>
+            <a:r>
+              <a:rPr lang="de-AT" dirty="0" smtClean="0"/>
+              <a:t> </a:t>
+            </a:r>
+          </a:p>
+          <a:p>
+            <a:pPr marL="457200" indent="-457200">
+              <a:buFont typeface="+mj-lt"/>
+              <a:buAutoNum type="arabicPeriod"/>
+            </a:pPr>
+            <a:r>
+              <a:rPr lang="de-AT" dirty="0" smtClean="0"/>
+              <a:t>Pick </a:t>
+            </a:r>
+            <a:r>
+              <a:rPr lang="de-AT" dirty="0" err="1" smtClean="0"/>
+              <a:t>one</a:t>
+            </a:r>
+            <a:r>
+              <a:rPr lang="de-AT" dirty="0" smtClean="0"/>
+              <a:t> </a:t>
+            </a:r>
+            <a:r>
+              <a:rPr lang="de-AT" dirty="0" err="1" smtClean="0"/>
+              <a:t>random</a:t>
+            </a:r>
+            <a:r>
+              <a:rPr lang="de-AT" dirty="0" smtClean="0"/>
+              <a:t>, </a:t>
+            </a:r>
+            <a:r>
+              <a:rPr lang="de-AT" dirty="0" err="1" smtClean="0"/>
+              <a:t>calculate</a:t>
+            </a:r>
+            <a:r>
+              <a:rPr lang="de-AT" dirty="0" smtClean="0"/>
+              <a:t> </a:t>
+            </a:r>
+            <a:r>
+              <a:rPr lang="de-AT" dirty="0" err="1" smtClean="0"/>
+              <a:t>near-hot</a:t>
+            </a:r>
+            <a:r>
+              <a:rPr lang="de-AT" dirty="0" smtClean="0"/>
+              <a:t> </a:t>
+            </a:r>
+            <a:r>
+              <a:rPr lang="de-AT" dirty="0" err="1" smtClean="0"/>
+              <a:t>and</a:t>
+            </a:r>
+            <a:r>
+              <a:rPr lang="de-AT" dirty="0" smtClean="0"/>
+              <a:t> </a:t>
+            </a:r>
+            <a:r>
+              <a:rPr lang="de-AT" dirty="0" err="1" smtClean="0"/>
+              <a:t>near</a:t>
+            </a:r>
+            <a:r>
+              <a:rPr lang="de-AT" dirty="0" smtClean="0"/>
+              <a:t> miss</a:t>
+            </a:r>
+          </a:p>
+          <a:p>
+            <a:pPr marL="457200" indent="-457200">
+              <a:buFont typeface="+mj-lt"/>
+              <a:buAutoNum type="arabicPeriod"/>
+            </a:pPr>
+            <a:r>
+              <a:rPr lang="de-AT" dirty="0" smtClean="0"/>
+              <a:t>Update </a:t>
+            </a:r>
+            <a:r>
+              <a:rPr lang="de-AT" dirty="0" err="1" smtClean="0"/>
+              <a:t>weights</a:t>
+            </a:r>
+            <a:endParaRPr lang="de-AT" dirty="0" smtClean="0"/>
+          </a:p>
+          <a:p>
+            <a:pPr marL="457200" indent="-457200">
+              <a:buFont typeface="+mj-lt"/>
+              <a:buAutoNum type="arabicPeriod"/>
+            </a:pPr>
+            <a:r>
+              <a:rPr lang="de-AT" dirty="0" err="1" smtClean="0"/>
+              <a:t>Choose</a:t>
+            </a:r>
+            <a:r>
+              <a:rPr lang="de-AT" dirty="0" smtClean="0"/>
+              <a:t> </a:t>
+            </a:r>
+            <a:r>
+              <a:rPr lang="de-AT" dirty="0" err="1" smtClean="0"/>
+              <a:t>features</a:t>
+            </a:r>
+            <a:r>
+              <a:rPr lang="de-AT" dirty="0" smtClean="0"/>
+              <a:t> </a:t>
+            </a:r>
+            <a:r>
+              <a:rPr lang="de-AT" dirty="0" err="1" smtClean="0"/>
+              <a:t>with</a:t>
+            </a:r>
+            <a:r>
+              <a:rPr lang="de-AT" dirty="0" smtClean="0"/>
+              <a:t> </a:t>
+            </a:r>
+            <a:r>
+              <a:rPr lang="de-AT" dirty="0" err="1" smtClean="0"/>
+              <a:t>highest</a:t>
+            </a:r>
+            <a:r>
+              <a:rPr lang="de-AT" dirty="0" smtClean="0"/>
+              <a:t> </a:t>
+            </a:r>
+            <a:r>
+              <a:rPr lang="de-AT" dirty="0" err="1" smtClean="0"/>
+              <a:t>weights</a:t>
+            </a:r>
+            <a:endParaRPr lang="de-AT" dirty="0"/>
+          </a:p>
+          <a:p>
+            <a:pPr marL="0" indent="0"/>
+            <a:endParaRPr lang="de-AT" dirty="0"/>
+          </a:p>
+        </p:txBody>
+      </p:sp>
+      <p:sp>
+        <p:nvSpPr>
+          <p:cNvPr id="5" name="Datumsplatzhalter 4"/>
+          <p:cNvSpPr>
+            <a:spLocks noGrp="1"/>
+          </p:cNvSpPr>
+          <p:nvPr>
+            <p:ph type="dt" sz="half" idx="10"/>
+          </p:nvPr>
+        </p:nvSpPr>
+        <p:spPr/>
+        <p:txBody>
+          <a:bodyPr/>
+          <a:lstStyle/>
+          <a:p>
+            <a:pPr>
+              <a:defRPr/>
+            </a:pPr>
+            <a:fld id="{F730624D-5A85-4FAC-A8C2-B755D15BE30C}" type="datetime1">
+              <a:rPr lang="de-AT" smtClean="0"/>
+              <a:t>25.01.2016</a:t>
+            </a:fld>
+            <a:endParaRPr lang="de-DE" dirty="0"/>
+          </a:p>
+        </p:txBody>
+      </p:sp>
+      <p:sp>
+        <p:nvSpPr>
+          <p:cNvPr id="6" name="Fußzeilenplatzhalter 5"/>
+          <p:cNvSpPr>
+            <a:spLocks noGrp="1"/>
+          </p:cNvSpPr>
+          <p:nvPr>
+            <p:ph type="ftr" sz="quarter" idx="11"/>
+          </p:nvPr>
+        </p:nvSpPr>
+        <p:spPr/>
+        <p:txBody>
+          <a:bodyPr/>
+          <a:lstStyle/>
+          <a:p>
+            <a:pPr>
+              <a:defRPr/>
+            </a:pPr>
+            <a:r>
+              <a:rPr lang="de-DE" smtClean="0"/>
+              <a:t>Silvana Podaras &amp; Florian Schober</a:t>
+            </a:r>
+            <a:endParaRPr lang="de-DE"/>
+          </a:p>
+        </p:txBody>
+      </p:sp>
+      <p:sp>
+        <p:nvSpPr>
+          <p:cNvPr id="7" name="Foliennummernplatzhalter 6"/>
+          <p:cNvSpPr>
+            <a:spLocks noGrp="1"/>
+          </p:cNvSpPr>
+          <p:nvPr>
+            <p:ph type="sldNum" sz="quarter" idx="12"/>
+          </p:nvPr>
+        </p:nvSpPr>
+        <p:spPr/>
+        <p:txBody>
+          <a:bodyPr/>
+          <a:lstStyle/>
+          <a:p>
+            <a:fld id="{E7C81DBF-6C1A-4CEB-BBA0-5651AFB5C718}" type="slidenum">
+              <a:rPr lang="de-DE" altLang="de-DE" smtClean="0"/>
+              <a:pPr/>
+              <a:t>12</a:t>
+            </a:fld>
+            <a:endParaRPr lang="de-DE" altLang="de-DE"/>
+          </a:p>
+        </p:txBody>
+      </p:sp>
+    </p:spTree>
+    <p:extLst>
+      <p:ext uri="{BB962C8B-B14F-4D97-AF65-F5344CB8AC3E}">
+        <p14:creationId xmlns:p14="http://schemas.microsoft.com/office/powerpoint/2010/main" val="2642371924"/>
+      </p:ext>
+    </p:extLst>
+  </p:cSld>
+  <p:clrMapOvr>
+    <a:masterClrMapping/>
+  </p:clrMapOvr>
+</p:sld>
+</file>
+
+<file path=ppt/slides/slide13.xml><?xml version="1.0" encoding="utf-8"?>
+<p:sld xmlns:a="http://schemas.openxmlformats.org/drawingml/2006/main" xmlns:r="http://schemas.openxmlformats.org/officeDocument/2006/relationships" xmlns:p="http://schemas.openxmlformats.org/presentationml/2006/main">
+  <p:cSld>
+    <p:spTree>
+      <p:nvGrpSpPr>
+        <p:cNvPr id="1" name=""/>
+        <p:cNvGrpSpPr/>
+        <p:nvPr/>
+      </p:nvGrpSpPr>
+      <p:grpSpPr>
+        <a:xfrm>
+          <a:off x="0" y="0"/>
+          <a:ext cx="0" cy="0"/>
+          <a:chOff x="0" y="0"/>
+          <a:chExt cx="0" cy="0"/>
+        </a:xfrm>
+      </p:grpSpPr>
+      <p:sp>
+        <p:nvSpPr>
+          <p:cNvPr id="5" name="Titel 4"/>
+          <p:cNvSpPr>
+            <a:spLocks noGrp="1"/>
+          </p:cNvSpPr>
+          <p:nvPr>
+            <p:ph type="title"/>
+          </p:nvPr>
+        </p:nvSpPr>
+        <p:spPr/>
+        <p:txBody>
+          <a:bodyPr/>
+          <a:lstStyle/>
+          <a:p>
+            <a:r>
+              <a:rPr lang="de-AT" dirty="0" smtClean="0"/>
+              <a:t>Wrapper </a:t>
+            </a:r>
+            <a:r>
+              <a:rPr lang="de-AT" dirty="0" err="1" smtClean="0"/>
+              <a:t>methods</a:t>
+            </a:r>
+            <a:endParaRPr lang="de-AT" dirty="0"/>
+          </a:p>
+        </p:txBody>
+      </p:sp>
+      <p:sp>
+        <p:nvSpPr>
+          <p:cNvPr id="6" name="Inhaltsplatzhalter 5"/>
+          <p:cNvSpPr>
+            <a:spLocks noGrp="1"/>
+          </p:cNvSpPr>
+          <p:nvPr>
+            <p:ph idx="1"/>
+          </p:nvPr>
+        </p:nvSpPr>
+        <p:spPr/>
+        <p:txBody>
+          <a:bodyPr/>
+          <a:lstStyle/>
+          <a:p>
             <a:pPr>
               <a:buFont typeface="Arial" panose="020B0604020202020204" pitchFamily="34" charset="0"/>
               <a:buChar char="•"/>
             </a:pPr>
             <a:r>
               <a:rPr lang="de-AT" dirty="0" err="1" smtClean="0"/>
-              <a:t>Iteartively</a:t>
-            </a:r>
-            <a:r>
-              <a:rPr lang="de-AT" dirty="0" smtClean="0"/>
-              <a:t> Search </a:t>
-            </a:r>
-            <a:r>
-              <a:rPr lang="de-AT" dirty="0" err="1" smtClean="0"/>
-              <a:t>and</a:t>
+              <a:t>Consider</a:t>
             </a:r>
             <a:r>
               <a:rPr lang="de-AT" dirty="0" smtClean="0"/>
@@ -5833,7 +7589,15 @@
             </a:r>
             <a:r>
               <a:rPr lang="de-AT" dirty="0" err="1" smtClean="0"/>
-              <a:t>Evaluate</a:t>
+              <a:t>classification</a:t>
+            </a:r>
+            <a:r>
+              <a:rPr lang="de-AT" dirty="0" smtClean="0"/>
+              <a:t> </a:t>
+            </a:r>
+            <a:r>
+              <a:rPr lang="de-AT" dirty="0" err="1" smtClean="0"/>
+              <a:t>algortihm</a:t>
             </a:r>
             <a:endParaRPr lang="de-AT" dirty="0" smtClean="0"/>
           </a:p>
@@ -5843,13 +7607,123 @@
               <a:buChar char="•"/>
             </a:pPr>
             <a:r>
-              <a:rPr lang="de-AT" dirty="0" err="1" smtClean="0"/>
+              <a:rPr lang="de-AT" dirty="0" smtClean="0"/>
+              <a:t>Select </a:t>
+            </a:r>
+            <a:r>
+              <a:rPr lang="de-AT" dirty="0" err="1" smtClean="0"/>
+              <a:t>features</a:t>
+            </a:r>
+            <a:r>
+              <a:rPr lang="de-AT" dirty="0" smtClean="0"/>
+              <a:t> </a:t>
+            </a:r>
+            <a:r>
+              <a:rPr lang="de-AT" dirty="0" err="1" smtClean="0"/>
+              <a:t>that</a:t>
+            </a:r>
+            <a:r>
+              <a:rPr lang="de-AT" dirty="0" smtClean="0"/>
+              <a:t> fit </a:t>
+            </a:r>
+            <a:r>
+              <a:rPr lang="de-AT" dirty="0" err="1" smtClean="0"/>
+              <a:t>classifier</a:t>
+            </a:r>
+            <a:r>
+              <a:rPr lang="de-AT" dirty="0" smtClean="0"/>
+              <a:t> </a:t>
+            </a:r>
+            <a:r>
+              <a:rPr lang="de-AT" dirty="0" err="1" smtClean="0"/>
+              <a:t>best</a:t>
+            </a:r>
+            <a:endParaRPr lang="de-AT" dirty="0" smtClean="0"/>
+          </a:p>
+          <a:p>
+            <a:pPr>
+              <a:buFont typeface="Arial" panose="020B0604020202020204" pitchFamily="34" charset="0"/>
+              <a:buChar char="•"/>
+            </a:pPr>
+            <a:endParaRPr lang="de-AT" dirty="0" smtClean="0"/>
+          </a:p>
+          <a:p>
+            <a:pPr>
+              <a:buFont typeface="Arial" panose="020B0604020202020204" pitchFamily="34" charset="0"/>
+              <a:buChar char="•"/>
+            </a:pPr>
+            <a:r>
+              <a:rPr lang="de-AT" dirty="0" err="1"/>
               <a:t>Computationally</a:t>
             </a:r>
             <a:r>
-              <a:rPr lang="de-AT" dirty="0" smtClean="0"/>
-              <a:t> expensive!</a:t>
-            </a:r>
+              <a:rPr lang="de-AT" dirty="0"/>
+              <a:t> expensive</a:t>
+            </a:r>
+            <a:r>
+              <a:rPr lang="de-AT" dirty="0" smtClean="0"/>
+              <a:t>!</a:t>
+            </a:r>
+          </a:p>
+          <a:p>
+            <a:pPr>
+              <a:buFont typeface="Arial" panose="020B0604020202020204" pitchFamily="34" charset="0"/>
+              <a:buChar char="•"/>
+            </a:pPr>
+            <a:r>
+              <a:rPr lang="de-AT" dirty="0" smtClean="0"/>
+              <a:t>Not </a:t>
+            </a:r>
+            <a:r>
+              <a:rPr lang="de-AT" dirty="0" smtClean="0"/>
+              <a:t>flexible (</a:t>
+            </a:r>
+            <a:r>
+              <a:rPr lang="de-AT" dirty="0" err="1" smtClean="0"/>
+              <a:t>cannot</a:t>
+            </a:r>
+            <a:r>
+              <a:rPr lang="de-AT" dirty="0" smtClean="0"/>
+              <a:t> </a:t>
+            </a:r>
+            <a:r>
+              <a:rPr lang="de-AT" dirty="0" err="1" smtClean="0"/>
+              <a:t>change</a:t>
+            </a:r>
+            <a:r>
+              <a:rPr lang="de-AT" dirty="0" smtClean="0"/>
+              <a:t> </a:t>
+            </a:r>
+            <a:r>
+              <a:rPr lang="de-AT" dirty="0" err="1" smtClean="0"/>
+              <a:t>classifier</a:t>
+            </a:r>
+            <a:r>
+              <a:rPr lang="de-AT" dirty="0" smtClean="0"/>
+              <a:t> </a:t>
+            </a:r>
+            <a:r>
+              <a:rPr lang="de-AT" dirty="0" err="1" smtClean="0"/>
+              <a:t>afterwards</a:t>
+            </a:r>
+            <a:r>
+              <a:rPr lang="de-AT" dirty="0" smtClean="0"/>
+              <a:t>)</a:t>
+            </a:r>
+            <a:endParaRPr lang="de-AT" dirty="0"/>
+          </a:p>
+          <a:p>
+            <a:pPr>
+              <a:buFont typeface="Arial" panose="020B0604020202020204" pitchFamily="34" charset="0"/>
+              <a:buChar char="•"/>
+            </a:pPr>
+            <a:endParaRPr lang="de-AT" dirty="0" smtClean="0"/>
+          </a:p>
+          <a:p>
+            <a:pPr>
+              <a:buFont typeface="Arial" panose="020B0604020202020204" pitchFamily="34" charset="0"/>
+              <a:buChar char="•"/>
+            </a:pPr>
             <a:endParaRPr lang="de-AT" dirty="0"/>
           </a:p>
         </p:txBody>
@@ -5924,7 +7798,7 @@
             <a:fld id="{CA3F91B5-C267-4146-949F-EABEA95DB02A}" type="slidenum">
               <a:rPr lang="de-AT" altLang="de-DE" smtClean="0"/>
               <a:pPr/>
-              <a:t>11</a:t>
+              <a:t>13</a:t>
             </a:fld>
             <a:endParaRPr lang="de-AT" altLang="de-DE"/>
           </a:p>
@@ -6000,7 +7874,7 @@
 </p:sld>
 </file>
 
-<file path=ppt/slides/slide12.xml><?xml version="1.0" encoding="utf-8"?>
+<file path=ppt/slides/slide14.xml><?xml version="1.0" encoding="utf-8"?>
 <p:sld xmlns:a="http://schemas.openxmlformats.org/drawingml/2006/main" xmlns:r="http://schemas.openxmlformats.org/officeDocument/2006/relationships" xmlns:p="http://schemas.openxmlformats.org/presentationml/2006/main">
   <p:cSld>
     <p:spTree>
@@ -6034,7 +7908,7 @@
           <a:p>
             <a:r>
               <a:rPr lang="de-AT" dirty="0" smtClean="0"/>
-              <a:t>Embedded  </a:t>
+              <a:t>Wrapper </a:t>
             </a:r>
             <a:r>
               <a:rPr lang="de-AT" dirty="0" err="1" smtClean="0"/>
@@ -6058,20 +7932,105 @@
         <p:txBody>
           <a:bodyPr/>
           <a:lstStyle/>
+          <a:p>
+            <a:pPr marL="457200" indent="-457200">
+              <a:buFont typeface="+mj-lt"/>
+              <a:buAutoNum type="arabicPeriod"/>
+            </a:pPr>
+            <a:r>
+              <a:rPr lang="de-AT" dirty="0" smtClean="0"/>
+              <a:t>Search </a:t>
+            </a:r>
+            <a:r>
+              <a:rPr lang="de-AT" dirty="0" err="1" smtClean="0"/>
+              <a:t>for</a:t>
+            </a:r>
+            <a:r>
+              <a:rPr lang="de-AT" dirty="0" smtClean="0"/>
+              <a:t> potential </a:t>
+            </a:r>
+            <a:r>
+              <a:rPr lang="de-AT" dirty="0" err="1" smtClean="0"/>
+              <a:t>subset</a:t>
+            </a:r>
+            <a:endParaRPr lang="de-AT" dirty="0"/>
+          </a:p>
+          <a:p>
+            <a:pPr marL="457200" indent="-457200">
+              <a:buFont typeface="+mj-lt"/>
+              <a:buAutoNum type="arabicPeriod"/>
+            </a:pPr>
+            <a:r>
+              <a:rPr lang="de-AT" dirty="0" err="1" smtClean="0"/>
+              <a:t>Estimate</a:t>
+            </a:r>
+            <a:r>
+              <a:rPr lang="de-AT" dirty="0" smtClean="0"/>
+              <a:t> </a:t>
+            </a:r>
+            <a:r>
+              <a:rPr lang="de-AT" dirty="0" err="1" smtClean="0"/>
+              <a:t>performance</a:t>
+            </a:r>
+            <a:r>
+              <a:rPr lang="de-AT" dirty="0" smtClean="0"/>
+              <a:t> on </a:t>
+            </a:r>
+            <a:r>
+              <a:rPr lang="de-AT" dirty="0" err="1" smtClean="0"/>
+              <a:t>classifier</a:t>
+            </a:r>
+            <a:endParaRPr lang="de-AT" dirty="0"/>
+          </a:p>
+          <a:p>
+            <a:pPr marL="457200" indent="-457200">
+              <a:buFont typeface="+mj-lt"/>
+              <a:buAutoNum type="arabicPeriod"/>
+            </a:pPr>
+            <a:r>
+              <a:rPr lang="de-AT" dirty="0" err="1" smtClean="0"/>
+              <a:t>Iterate</a:t>
+            </a:r>
+            <a:r>
+              <a:rPr lang="de-AT" dirty="0" smtClean="0"/>
+              <a:t> </a:t>
+            </a:r>
+            <a:r>
+              <a:rPr lang="de-AT" dirty="0" err="1" smtClean="0"/>
+              <a:t>until</a:t>
+            </a:r>
+            <a:r>
+              <a:rPr lang="de-AT" dirty="0" smtClean="0"/>
+              <a:t> </a:t>
+            </a:r>
+            <a:r>
+              <a:rPr lang="de-AT" dirty="0" err="1" smtClean="0"/>
+              <a:t>desired</a:t>
+            </a:r>
+            <a:r>
+              <a:rPr lang="de-AT" dirty="0" smtClean="0"/>
+              <a:t> </a:t>
+            </a:r>
+            <a:r>
+              <a:rPr lang="de-AT" dirty="0" err="1" smtClean="0"/>
+              <a:t>quality</a:t>
+            </a:r>
+            <a:r>
+              <a:rPr lang="de-AT" dirty="0" smtClean="0"/>
+              <a:t> </a:t>
+            </a:r>
+            <a:r>
+              <a:rPr lang="de-AT" dirty="0" err="1" smtClean="0"/>
+              <a:t>achieved</a:t>
+            </a:r>
+            <a:endParaRPr lang="de-AT" dirty="0" smtClean="0"/>
+          </a:p>
           <a:p>
             <a:pPr>
               <a:buFont typeface="Arial" panose="020B0604020202020204" pitchFamily="34" charset="0"/>
               <a:buChar char="•"/>
             </a:pPr>
-            <a:r>
-              <a:rPr lang="de-AT" dirty="0" smtClean="0"/>
-              <a:t>Hybrid </a:t>
-            </a:r>
-            <a:r>
-              <a:rPr lang="de-AT" dirty="0" err="1" smtClean="0"/>
-              <a:t>method</a:t>
-            </a:r>
-            <a:endParaRPr lang="de-AT" dirty="0" smtClean="0"/>
+            <a:endParaRPr lang="de-AT" dirty="0"/>
           </a:p>
           <a:p>
             <a:pPr>
@@ -6080,7 +8039,366 @@
             </a:pPr>
             <a:r>
               <a:rPr lang="de-AT" dirty="0" err="1" smtClean="0"/>
-              <a:t>Computationally</a:t>
+              <a:t>F.example</a:t>
+            </a:r>
+            <a:r>
+              <a:rPr lang="de-AT" dirty="0" smtClean="0"/>
+              <a:t>: </a:t>
+            </a:r>
+            <a:r>
+              <a:rPr lang="de-AT" dirty="0" err="1" smtClean="0"/>
+              <a:t>Branch</a:t>
+            </a:r>
+            <a:r>
+              <a:rPr lang="de-AT" dirty="0" smtClean="0"/>
+              <a:t> </a:t>
+            </a:r>
+            <a:r>
+              <a:rPr lang="de-AT" dirty="0" err="1" smtClean="0"/>
+              <a:t>and</a:t>
+            </a:r>
+            <a:r>
+              <a:rPr lang="de-AT" dirty="0" smtClean="0"/>
+              <a:t> </a:t>
+            </a:r>
+            <a:r>
+              <a:rPr lang="de-AT" dirty="0" err="1" smtClean="0"/>
+              <a:t>bound</a:t>
+            </a:r>
+            <a:r>
+              <a:rPr lang="de-AT" dirty="0" smtClean="0"/>
+              <a:t>, </a:t>
+            </a:r>
+            <a:r>
+              <a:rPr lang="de-AT" dirty="0" err="1" smtClean="0"/>
+              <a:t>genetic</a:t>
+            </a:r>
+            <a:r>
+              <a:rPr lang="de-AT" dirty="0" smtClean="0"/>
+              <a:t> </a:t>
+            </a:r>
+            <a:r>
+              <a:rPr lang="de-AT" dirty="0" err="1" smtClean="0"/>
+              <a:t>algorithms</a:t>
+            </a:r>
+            <a:endParaRPr lang="de-AT" dirty="0" smtClean="0"/>
+          </a:p>
+          <a:p>
+            <a:pPr marL="0" indent="0"/>
+            <a:endParaRPr lang="de-AT" dirty="0"/>
+          </a:p>
+          <a:p>
+            <a:pPr marL="0" indent="0"/>
+            <a:endParaRPr lang="de-AT" dirty="0"/>
+          </a:p>
+        </p:txBody>
+      </p:sp>
+      <p:sp>
+        <p:nvSpPr>
+          <p:cNvPr id="2" name="Datumsplatzhalter 1"/>
+          <p:cNvSpPr>
+            <a:spLocks noGrp="1"/>
+          </p:cNvSpPr>
+          <p:nvPr>
+            <p:ph type="dt" sz="half" idx="10"/>
+          </p:nvPr>
+        </p:nvSpPr>
+        <p:spPr/>
+        <p:txBody>
+          <a:bodyPr/>
+          <a:lstStyle/>
+          <a:p>
+            <a:pPr>
+              <a:defRPr/>
+            </a:pPr>
+            <a:fld id="{A99E4E83-FA2E-46A0-B301-8CE1B5AC943C}" type="datetime1">
+              <a:rPr lang="de-AT" smtClean="0"/>
+              <a:t>25.01.2016</a:t>
+            </a:fld>
+            <a:endParaRPr lang="de-AT" dirty="0"/>
+          </a:p>
+        </p:txBody>
+      </p:sp>
+      <p:sp>
+        <p:nvSpPr>
+          <p:cNvPr id="3" name="Fußzeilenplatzhalter 2"/>
+          <p:cNvSpPr>
+            <a:spLocks noGrp="1"/>
+          </p:cNvSpPr>
+          <p:nvPr>
+            <p:ph type="ftr" sz="quarter" idx="11"/>
+          </p:nvPr>
+        </p:nvSpPr>
+        <p:spPr/>
+        <p:txBody>
+          <a:bodyPr/>
+          <a:lstStyle/>
+          <a:p>
+            <a:pPr>
+              <a:defRPr/>
+            </a:pPr>
+            <a:r>
+              <a:rPr lang="de-AT" smtClean="0"/>
+              <a:t>Silvana Podaras &amp; Florian Schober</a:t>
+            </a:r>
+            <a:endParaRPr lang="de-AT"/>
+          </a:p>
+        </p:txBody>
+      </p:sp>
+      <p:sp>
+        <p:nvSpPr>
+          <p:cNvPr id="4" name="Foliennummernplatzhalter 3"/>
+          <p:cNvSpPr>
+            <a:spLocks noGrp="1"/>
+          </p:cNvSpPr>
+          <p:nvPr>
+            <p:ph type="sldNum" sz="quarter" idx="12"/>
+          </p:nvPr>
+        </p:nvSpPr>
+        <p:spPr/>
+        <p:txBody>
+          <a:bodyPr/>
+          <a:lstStyle/>
+          <a:p>
+            <a:fld id="{CA3F91B5-C267-4146-949F-EABEA95DB02A}" type="slidenum">
+              <a:rPr lang="de-AT" altLang="de-DE" smtClean="0"/>
+              <a:pPr/>
+              <a:t>14</a:t>
+            </a:fld>
+            <a:endParaRPr lang="de-AT" altLang="de-DE"/>
+          </a:p>
+        </p:txBody>
+      </p:sp>
+      <p:sp>
+        <p:nvSpPr>
+          <p:cNvPr id="7" name="Nach rechts gekrümmter Pfeil 6"/>
+          <p:cNvSpPr/>
+          <p:nvPr/>
+        </p:nvSpPr>
+        <p:spPr>
+          <a:xfrm>
+            <a:off x="7308304" y="1285860"/>
+            <a:ext cx="703789" cy="938385"/>
+          </a:xfrm>
+          <a:prstGeom prst="curvedRightArrow">
+            <a:avLst/>
+          </a:prstGeom>
+          <a:solidFill>
+            <a:schemeClr val="tx1"/>
+          </a:solidFill>
+          <a:ln>
+            <a:noFill/>
+          </a:ln>
+        </p:spPr>
+        <p:style>
+          <a:lnRef idx="2">
+            <a:schemeClr val="accent1">
+              <a:shade val="50000"/>
+            </a:schemeClr>
+          </a:lnRef>
+          <a:fillRef idx="1">
+            <a:schemeClr val="accent1"/>
+          </a:fillRef>
+          <a:effectRef idx="0">
+            <a:schemeClr val="accent1"/>
+          </a:effectRef>
+          <a:fontRef idx="minor">
+            <a:schemeClr val="lt1"/>
+          </a:fontRef>
+        </p:style>
+        <p:txBody>
+          <a:bodyPr rtlCol="0" anchor="ctr"/>
+          <a:lstStyle/>
+          <a:p>
+            <a:pPr algn="ctr"/>
+            <a:endParaRPr lang="de-AT">
+              <a:solidFill>
+                <a:schemeClr val="tx1"/>
+              </a:solidFill>
+            </a:endParaRPr>
+          </a:p>
+        </p:txBody>
+      </p:sp>
+    </p:spTree>
+    <p:extLst>
+      <p:ext uri="{BB962C8B-B14F-4D97-AF65-F5344CB8AC3E}">
+        <p14:creationId xmlns:p14="http://schemas.microsoft.com/office/powerpoint/2010/main" val="1570422897"/>
+      </p:ext>
+    </p:extLst>
+  </p:cSld>
+  <p:clrMapOvr>
+    <a:masterClrMapping/>
+  </p:clrMapOvr>
+  <p:timing>
+    <p:tnLst>
+      <p:par>
+        <p:cTn id="1" dur="indefinite" restart="never" nodeType="tmRoot"/>
+      </p:par>
+    </p:tnLst>
+  </p:timing>
+</p:sld>
+</file>
+
+<file path=ppt/slides/slide15.xml><?xml version="1.0" encoding="utf-8"?>
+<p:sld xmlns:a="http://schemas.openxmlformats.org/drawingml/2006/main" xmlns:r="http://schemas.openxmlformats.org/officeDocument/2006/relationships" xmlns:p="http://schemas.openxmlformats.org/presentationml/2006/main">
+  <p:cSld>
+    <p:spTree>
+      <p:nvGrpSpPr>
+        <p:cNvPr id="1" name=""/>
+        <p:cNvGrpSpPr/>
+        <p:nvPr/>
+      </p:nvGrpSpPr>
+      <p:grpSpPr>
+        <a:xfrm>
+          <a:off x="0" y="0"/>
+          <a:ext cx="0" cy="0"/>
+          <a:chOff x="0" y="0"/>
+          <a:chExt cx="0" cy="0"/>
+        </a:xfrm>
+      </p:grpSpPr>
+      <p:sp>
+        <p:nvSpPr>
+          <p:cNvPr id="5" name="Titel 4"/>
+          <p:cNvSpPr>
+            <a:spLocks noGrp="1"/>
+          </p:cNvSpPr>
+          <p:nvPr>
+            <p:ph type="title"/>
+          </p:nvPr>
+        </p:nvSpPr>
+        <p:spPr/>
+        <p:txBody>
+          <a:bodyPr/>
+          <a:lstStyle/>
+          <a:p>
+            <a:r>
+              <a:rPr lang="de-AT" dirty="0" err="1" smtClean="0"/>
+              <a:t>Example</a:t>
+            </a:r>
+            <a:r>
+              <a:rPr lang="de-AT" dirty="0" smtClean="0"/>
+              <a:t>: </a:t>
+            </a:r>
+            <a:r>
+              <a:rPr lang="de-AT" dirty="0" err="1" smtClean="0"/>
+              <a:t>Genetic</a:t>
+            </a:r>
+            <a:r>
+              <a:rPr lang="de-AT" dirty="0" smtClean="0"/>
+              <a:t> </a:t>
+            </a:r>
+            <a:r>
+              <a:rPr lang="de-AT" dirty="0" err="1" smtClean="0"/>
+              <a:t>algorithms</a:t>
+            </a:r>
+            <a:endParaRPr lang="de-AT" dirty="0"/>
+          </a:p>
+        </p:txBody>
+      </p:sp>
+      <p:sp>
+        <p:nvSpPr>
+          <p:cNvPr id="6" name="Inhaltsplatzhalter 5"/>
+          <p:cNvSpPr>
+            <a:spLocks noGrp="1"/>
+          </p:cNvSpPr>
+          <p:nvPr>
+            <p:ph idx="1"/>
+          </p:nvPr>
+        </p:nvSpPr>
+        <p:spPr/>
+        <p:txBody>
+          <a:bodyPr/>
+          <a:lstStyle/>
+          <a:p>
+            <a:pPr marL="457200" indent="-457200">
+              <a:buFont typeface="+mj-lt"/>
+              <a:buAutoNum type="arabicPeriod"/>
+            </a:pPr>
+            <a:r>
+              <a:rPr lang="de-AT" dirty="0" smtClean="0"/>
+              <a:t>Search </a:t>
+            </a:r>
+            <a:r>
+              <a:rPr lang="de-AT" dirty="0" err="1" smtClean="0"/>
+              <a:t>for</a:t>
+            </a:r>
+            <a:r>
+              <a:rPr lang="de-AT" dirty="0" smtClean="0"/>
+              <a:t> potential </a:t>
+            </a:r>
+            <a:r>
+              <a:rPr lang="de-AT" dirty="0" err="1" smtClean="0"/>
+              <a:t>subset</a:t>
+            </a:r>
+            <a:endParaRPr lang="de-AT" dirty="0"/>
+          </a:p>
+          <a:p>
+            <a:pPr marL="457200" indent="-457200">
+              <a:buFont typeface="+mj-lt"/>
+              <a:buAutoNum type="arabicPeriod"/>
+            </a:pPr>
+            <a:r>
+              <a:rPr lang="de-AT" dirty="0" err="1" smtClean="0"/>
+              <a:t>Estimate</a:t>
+            </a:r>
+            <a:r>
+              <a:rPr lang="de-AT" dirty="0" smtClean="0"/>
+              <a:t> </a:t>
+            </a:r>
+            <a:r>
+              <a:rPr lang="de-AT" dirty="0" err="1" smtClean="0"/>
+              <a:t>performance</a:t>
+            </a:r>
+            <a:r>
+              <a:rPr lang="de-AT" dirty="0" smtClean="0"/>
+              <a:t> on </a:t>
+            </a:r>
+            <a:r>
+              <a:rPr lang="de-AT" dirty="0" err="1" smtClean="0"/>
+              <a:t>classifier</a:t>
+            </a:r>
+            <a:endParaRPr lang="de-AT" dirty="0"/>
+          </a:p>
+          <a:p>
+            <a:pPr marL="457200" indent="-457200">
+              <a:buFont typeface="+mj-lt"/>
+              <a:buAutoNum type="arabicPeriod"/>
+            </a:pPr>
+            <a:r>
+              <a:rPr lang="de-AT" dirty="0" err="1" smtClean="0"/>
+              <a:t>Iterate</a:t>
+            </a:r>
+            <a:r>
+              <a:rPr lang="de-AT" dirty="0" smtClean="0"/>
+              <a:t> </a:t>
+            </a:r>
+            <a:r>
+              <a:rPr lang="de-AT" dirty="0" err="1" smtClean="0"/>
+              <a:t>until</a:t>
+            </a:r>
+            <a:r>
+              <a:rPr lang="de-AT" dirty="0" smtClean="0"/>
+              <a:t> </a:t>
+            </a:r>
+            <a:r>
+              <a:rPr lang="de-AT" dirty="0" err="1" smtClean="0"/>
+              <a:t>desired</a:t>
+            </a:r>
+            <a:r>
+              <a:rPr lang="de-AT" dirty="0" smtClean="0"/>
+              <a:t> </a:t>
+            </a:r>
+            <a:r>
+              <a:rPr lang="de-AT" dirty="0" err="1" smtClean="0"/>
+              <a:t>quality</a:t>
+            </a:r>
+            <a:r>
+              <a:rPr lang="de-AT" dirty="0" smtClean="0"/>
+              <a:t> </a:t>
+            </a:r>
+            <a:r>
+              <a:rPr lang="de-AT" dirty="0" err="1" smtClean="0"/>
+              <a:t>achieved</a:t>
             </a:r>
             <a:endParaRPr lang="de-AT" dirty="0" smtClean="0"/>
           </a:p>
@@ -6089,6 +8407,312 @@
               <a:buFont typeface="Arial" panose="020B0604020202020204" pitchFamily="34" charset="0"/>
               <a:buChar char="•"/>
             </a:pPr>
+            <a:endParaRPr lang="de-AT" dirty="0"/>
+          </a:p>
+          <a:p>
+            <a:pPr>
+              <a:buFont typeface="Arial" panose="020B0604020202020204" pitchFamily="34" charset="0"/>
+              <a:buChar char="•"/>
+            </a:pPr>
+            <a:r>
+              <a:rPr lang="de-AT" dirty="0" err="1" smtClean="0"/>
+              <a:t>F.example</a:t>
+            </a:r>
+            <a:r>
+              <a:rPr lang="de-AT" dirty="0" smtClean="0"/>
+              <a:t>: </a:t>
+            </a:r>
+            <a:r>
+              <a:rPr lang="de-AT" dirty="0" err="1" smtClean="0"/>
+              <a:t>Branch</a:t>
+            </a:r>
+            <a:r>
+              <a:rPr lang="de-AT" dirty="0" smtClean="0"/>
+              <a:t> </a:t>
+            </a:r>
+            <a:r>
+              <a:rPr lang="de-AT" dirty="0" err="1" smtClean="0"/>
+              <a:t>and</a:t>
+            </a:r>
+            <a:r>
+              <a:rPr lang="de-AT" dirty="0" smtClean="0"/>
+              <a:t> </a:t>
+            </a:r>
+            <a:r>
+              <a:rPr lang="de-AT" dirty="0" err="1" smtClean="0"/>
+              <a:t>bound</a:t>
+            </a:r>
+            <a:r>
+              <a:rPr lang="de-AT" dirty="0" smtClean="0"/>
+              <a:t>, </a:t>
+            </a:r>
+            <a:r>
+              <a:rPr lang="de-AT" dirty="0" err="1" smtClean="0"/>
+              <a:t>genetic</a:t>
+            </a:r>
+            <a:r>
+              <a:rPr lang="de-AT" dirty="0" smtClean="0"/>
+              <a:t> </a:t>
+            </a:r>
+            <a:r>
+              <a:rPr lang="de-AT" dirty="0" err="1" smtClean="0"/>
+              <a:t>algorithms</a:t>
+            </a:r>
+            <a:endParaRPr lang="de-AT" dirty="0" smtClean="0"/>
+          </a:p>
+          <a:p>
+            <a:pPr marL="0" indent="0"/>
+            <a:endParaRPr lang="de-AT" dirty="0"/>
+          </a:p>
+          <a:p>
+            <a:pPr marL="0" indent="0"/>
+            <a:endParaRPr lang="de-AT" dirty="0"/>
+          </a:p>
+        </p:txBody>
+      </p:sp>
+      <p:sp>
+        <p:nvSpPr>
+          <p:cNvPr id="2" name="Datumsplatzhalter 1"/>
+          <p:cNvSpPr>
+            <a:spLocks noGrp="1"/>
+          </p:cNvSpPr>
+          <p:nvPr>
+            <p:ph type="dt" sz="half" idx="10"/>
+          </p:nvPr>
+        </p:nvSpPr>
+        <p:spPr/>
+        <p:txBody>
+          <a:bodyPr/>
+          <a:lstStyle/>
+          <a:p>
+            <a:pPr>
+              <a:defRPr/>
+            </a:pPr>
+            <a:fld id="{A99E4E83-FA2E-46A0-B301-8CE1B5AC943C}" type="datetime1">
+              <a:rPr lang="de-AT" smtClean="0"/>
+              <a:t>25.01.2016</a:t>
+            </a:fld>
+            <a:endParaRPr lang="de-AT" dirty="0"/>
+          </a:p>
+        </p:txBody>
+      </p:sp>
+      <p:sp>
+        <p:nvSpPr>
+          <p:cNvPr id="3" name="Fußzeilenplatzhalter 2"/>
+          <p:cNvSpPr>
+            <a:spLocks noGrp="1"/>
+          </p:cNvSpPr>
+          <p:nvPr>
+            <p:ph type="ftr" sz="quarter" idx="11"/>
+          </p:nvPr>
+        </p:nvSpPr>
+        <p:spPr/>
+        <p:txBody>
+          <a:bodyPr/>
+          <a:lstStyle/>
+          <a:p>
+            <a:pPr>
+              <a:defRPr/>
+            </a:pPr>
+            <a:r>
+              <a:rPr lang="de-AT" smtClean="0"/>
+              <a:t>Silvana Podaras &amp; Florian Schober</a:t>
+            </a:r>
+            <a:endParaRPr lang="de-AT"/>
+          </a:p>
+        </p:txBody>
+      </p:sp>
+      <p:sp>
+        <p:nvSpPr>
+          <p:cNvPr id="4" name="Foliennummernplatzhalter 3"/>
+          <p:cNvSpPr>
+            <a:spLocks noGrp="1"/>
+          </p:cNvSpPr>
+          <p:nvPr>
+            <p:ph type="sldNum" sz="quarter" idx="12"/>
+          </p:nvPr>
+        </p:nvSpPr>
+        <p:spPr/>
+        <p:txBody>
+          <a:bodyPr/>
+          <a:lstStyle/>
+          <a:p>
+            <a:fld id="{CA3F91B5-C267-4146-949F-EABEA95DB02A}" type="slidenum">
+              <a:rPr lang="de-AT" altLang="de-DE" smtClean="0"/>
+              <a:pPr/>
+              <a:t>15</a:t>
+            </a:fld>
+            <a:endParaRPr lang="de-AT" altLang="de-DE"/>
+          </a:p>
+        </p:txBody>
+      </p:sp>
+      <p:sp>
+        <p:nvSpPr>
+          <p:cNvPr id="7" name="Nach rechts gekrümmter Pfeil 6"/>
+          <p:cNvSpPr/>
+          <p:nvPr/>
+        </p:nvSpPr>
+        <p:spPr>
+          <a:xfrm>
+            <a:off x="7308304" y="1285860"/>
+            <a:ext cx="703789" cy="938385"/>
+          </a:xfrm>
+          <a:prstGeom prst="curvedRightArrow">
+            <a:avLst/>
+          </a:prstGeom>
+          <a:solidFill>
+            <a:schemeClr val="tx1"/>
+          </a:solidFill>
+          <a:ln>
+            <a:noFill/>
+          </a:ln>
+        </p:spPr>
+        <p:style>
+          <a:lnRef idx="2">
+            <a:schemeClr val="accent1">
+              <a:shade val="50000"/>
+            </a:schemeClr>
+          </a:lnRef>
+          <a:fillRef idx="1">
+            <a:schemeClr val="accent1"/>
+          </a:fillRef>
+          <a:effectRef idx="0">
+            <a:schemeClr val="accent1"/>
+          </a:effectRef>
+          <a:fontRef idx="minor">
+            <a:schemeClr val="lt1"/>
+          </a:fontRef>
+        </p:style>
+        <p:txBody>
+          <a:bodyPr rtlCol="0" anchor="ctr"/>
+          <a:lstStyle/>
+          <a:p>
+            <a:pPr algn="ctr"/>
+            <a:endParaRPr lang="de-AT">
+              <a:solidFill>
+                <a:schemeClr val="tx1"/>
+              </a:solidFill>
+            </a:endParaRPr>
+          </a:p>
+        </p:txBody>
+      </p:sp>
+    </p:spTree>
+    <p:extLst>
+      <p:ext uri="{BB962C8B-B14F-4D97-AF65-F5344CB8AC3E}">
+        <p14:creationId xmlns:p14="http://schemas.microsoft.com/office/powerpoint/2010/main" val="3514552970"/>
+      </p:ext>
+    </p:extLst>
+  </p:cSld>
+  <p:clrMapOvr>
+    <a:masterClrMapping/>
+  </p:clrMapOvr>
+  <p:timing>
+    <p:tnLst>
+      <p:par>
+        <p:cTn id="1" dur="indefinite" restart="never" nodeType="tmRoot"/>
+      </p:par>
+    </p:tnLst>
+  </p:timing>
+</p:sld>
+</file>
+
+<file path=ppt/slides/slide16.xml><?xml version="1.0" encoding="utf-8"?>
+<p:sld xmlns:a="http://schemas.openxmlformats.org/drawingml/2006/main" xmlns:r="http://schemas.openxmlformats.org/officeDocument/2006/relationships" xmlns:p="http://schemas.openxmlformats.org/presentationml/2006/main">
+  <p:cSld>
+    <p:spTree>
+      <p:nvGrpSpPr>
+        <p:cNvPr id="1" name=""/>
+        <p:cNvGrpSpPr/>
+        <p:nvPr/>
+      </p:nvGrpSpPr>
+      <p:grpSpPr>
+        <a:xfrm>
+          <a:off x="0" y="0"/>
+          <a:ext cx="0" cy="0"/>
+          <a:chOff x="0" y="0"/>
+          <a:chExt cx="0" cy="0"/>
+        </a:xfrm>
+      </p:grpSpPr>
+      <p:sp>
+        <p:nvSpPr>
+          <p:cNvPr id="5" name="Titel 4"/>
+          <p:cNvSpPr>
+            <a:spLocks noGrp="1"/>
+          </p:cNvSpPr>
+          <p:nvPr>
+            <p:ph type="title"/>
+          </p:nvPr>
+        </p:nvSpPr>
+        <p:spPr/>
+        <p:txBody>
+          <a:bodyPr/>
+          <a:lstStyle/>
+          <a:p>
+            <a:r>
+              <a:rPr lang="de-AT" dirty="0" smtClean="0"/>
+              <a:t>Embedded  </a:t>
+            </a:r>
+            <a:r>
+              <a:rPr lang="de-AT" dirty="0" err="1" smtClean="0"/>
+              <a:t>methods</a:t>
+            </a:r>
+            <a:endParaRPr lang="de-AT" dirty="0"/>
+          </a:p>
+        </p:txBody>
+      </p:sp>
+      <p:sp>
+        <p:nvSpPr>
+          <p:cNvPr id="6" name="Inhaltsplatzhalter 5"/>
+          <p:cNvSpPr>
+            <a:spLocks noGrp="1"/>
+          </p:cNvSpPr>
+          <p:nvPr>
+            <p:ph idx="1"/>
+          </p:nvPr>
+        </p:nvSpPr>
+        <p:spPr/>
+        <p:txBody>
+          <a:bodyPr/>
+          <a:lstStyle/>
+          <a:p>
+            <a:pPr>
+              <a:buFont typeface="Arial" panose="020B0604020202020204" pitchFamily="34" charset="0"/>
+              <a:buChar char="•"/>
+            </a:pPr>
+            <a:r>
+              <a:rPr lang="de-AT" dirty="0" smtClean="0"/>
+              <a:t>Hybrid </a:t>
+            </a:r>
+            <a:r>
+              <a:rPr lang="de-AT" dirty="0" err="1" smtClean="0"/>
+              <a:t>method</a:t>
+            </a:r>
+            <a:endParaRPr lang="de-AT" dirty="0" smtClean="0"/>
+          </a:p>
+          <a:p>
+            <a:pPr>
+              <a:buFont typeface="Arial" panose="020B0604020202020204" pitchFamily="34" charset="0"/>
+              <a:buChar char="•"/>
+            </a:pPr>
+            <a:r>
+              <a:rPr lang="de-AT" dirty="0" err="1" smtClean="0"/>
+              <a:t>Computationally</a:t>
+            </a:r>
+            <a:r>
+              <a:rPr lang="de-AT" dirty="0" smtClean="0"/>
+              <a:t> </a:t>
+            </a:r>
+            <a:r>
+              <a:rPr lang="de-AT" dirty="0" err="1" smtClean="0"/>
+              <a:t>efficient</a:t>
+            </a:r>
+            <a:endParaRPr lang="de-AT" dirty="0" smtClean="0"/>
+          </a:p>
+          <a:p>
+            <a:pPr>
+              <a:buFont typeface="Arial" panose="020B0604020202020204" pitchFamily="34" charset="0"/>
+              <a:buChar char="•"/>
+            </a:pPr>
             <a:r>
               <a:rPr lang="de-AT" dirty="0" smtClean="0"/>
               <a:t>Higher </a:t>
@@ -6112,6 +8736,37 @@
             <a:r>
               <a:rPr lang="de-AT" dirty="0" err="1" smtClean="0"/>
               <a:t>classification</a:t>
+            </a:r>
+            <a:endParaRPr lang="de-AT" dirty="0" smtClean="0"/>
+          </a:p>
+          <a:p>
+            <a:pPr>
+              <a:buFont typeface="Arial" panose="020B0604020202020204" pitchFamily="34" charset="0"/>
+              <a:buChar char="•"/>
+            </a:pPr>
+            <a:endParaRPr lang="de-AT" dirty="0"/>
+          </a:p>
+          <a:p>
+            <a:pPr marL="0" indent="0"/>
+            <a:r>
+              <a:rPr lang="de-AT" dirty="0" err="1" smtClean="0"/>
+              <a:t>F.ex</a:t>
+            </a:r>
+            <a:r>
+              <a:rPr lang="de-AT" dirty="0" smtClean="0"/>
+              <a:t>. SVM, </a:t>
+            </a:r>
+            <a:r>
+              <a:rPr lang="de-AT" dirty="0" err="1" smtClean="0"/>
+              <a:t>Logistic</a:t>
+            </a:r>
+            <a:r>
+              <a:rPr lang="de-AT" dirty="0" smtClean="0"/>
+              <a:t> </a:t>
+            </a:r>
+            <a:r>
+              <a:rPr lang="de-AT" dirty="0" err="1" smtClean="0"/>
+              <a:t>regression</a:t>
             </a:r>
             <a:endParaRPr lang="de-AT" dirty="0"/>
           </a:p>
@@ -6187,7 +8842,7 @@
             <a:fld id="{CA3F91B5-C267-4146-949F-EABEA95DB02A}" type="slidenum">
               <a:rPr lang="de-AT" altLang="de-DE" smtClean="0"/>
               <a:pPr/>
-              <a:t>12</a:t>
+              <a:t>16</a:t>
             </a:fld>
             <a:endParaRPr lang="de-AT" altLang="de-DE"/>
           </a:p>
@@ -6304,7 +8959,7 @@
 </p:sld>
 </file>
 
-<file path=ppt/slides/slide13.xml><?xml version="1.0" encoding="utf-8"?>
+<file path=ppt/slides/slide17.xml><?xml version="1.0" encoding="utf-8"?>
 <p:sld xmlns:a="http://schemas.openxmlformats.org/drawingml/2006/main" xmlns:r="http://schemas.openxmlformats.org/officeDocument/2006/relationships" xmlns:p="http://schemas.openxmlformats.org/presentationml/2006/main">
   <p:cSld>
     <p:spTree>
@@ -6338,6 +8993,312 @@
           <a:p>
             <a:r>
               <a:rPr lang="de-AT" dirty="0" smtClean="0"/>
+              <a:t>Embedded  </a:t>
+            </a:r>
+            <a:r>
+              <a:rPr lang="de-AT" dirty="0" err="1" smtClean="0"/>
+              <a:t>methods</a:t>
+            </a:r>
+            <a:endParaRPr lang="de-AT" dirty="0"/>
+          </a:p>
+        </p:txBody>
+      </p:sp>
+      <p:sp>
+        <p:nvSpPr>
+          <p:cNvPr id="6" name="Inhaltsplatzhalter 5"/>
+          <p:cNvSpPr>
+            <a:spLocks noGrp="1"/>
+          </p:cNvSpPr>
+          <p:nvPr>
+            <p:ph idx="1"/>
+          </p:nvPr>
+        </p:nvSpPr>
+        <p:spPr/>
+        <p:txBody>
+          <a:bodyPr/>
+          <a:lstStyle/>
+          <a:p>
+            <a:pPr>
+              <a:buFont typeface="Arial" panose="020B0604020202020204" pitchFamily="34" charset="0"/>
+              <a:buChar char="•"/>
+            </a:pPr>
+            <a:r>
+              <a:rPr lang="en-US" dirty="0" smtClean="0"/>
+              <a:t>PAPER: “In </a:t>
+            </a:r>
+            <a:r>
+              <a:rPr lang="en-US" dirty="0"/>
+              <a:t>regularization methods, classifier induction and feature selection are </a:t>
+            </a:r>
+            <a:r>
+              <a:rPr lang="en-US" dirty="0" smtClean="0"/>
+              <a:t>achieved </a:t>
+            </a:r>
+            <a:r>
+              <a:rPr lang="de-AT" dirty="0" err="1" smtClean="0"/>
+              <a:t>simultaneously</a:t>
+            </a:r>
+            <a:r>
+              <a:rPr lang="de-AT" dirty="0" smtClean="0"/>
+              <a:t> </a:t>
+            </a:r>
+            <a:r>
+              <a:rPr lang="de-AT" dirty="0" err="1"/>
+              <a:t>by</a:t>
+            </a:r>
+            <a:r>
+              <a:rPr lang="de-AT" dirty="0"/>
+              <a:t> </a:t>
+            </a:r>
+            <a:r>
+              <a:rPr lang="de-AT" dirty="0" err="1" smtClean="0"/>
+              <a:t>estimating</a:t>
+            </a:r>
+            <a:r>
+              <a:rPr lang="de-AT" dirty="0" smtClean="0"/>
+              <a:t> </a:t>
+            </a:r>
+            <a:r>
+              <a:rPr lang="en-US" dirty="0" smtClean="0"/>
+              <a:t>w </a:t>
+            </a:r>
+            <a:r>
+              <a:rPr lang="en-US" dirty="0"/>
+              <a:t>with properly tuned </a:t>
+            </a:r>
+            <a:r>
+              <a:rPr lang="en-US"/>
+              <a:t>penalties</a:t>
+            </a:r>
+            <a:r>
+              <a:rPr lang="en-US" smtClean="0"/>
+              <a:t>.”</a:t>
+            </a:r>
+            <a:endParaRPr lang="de-AT" dirty="0"/>
+          </a:p>
+        </p:txBody>
+      </p:sp>
+      <p:sp>
+        <p:nvSpPr>
+          <p:cNvPr id="2" name="Datumsplatzhalter 1"/>
+          <p:cNvSpPr>
+            <a:spLocks noGrp="1"/>
+          </p:cNvSpPr>
+          <p:nvPr>
+            <p:ph type="dt" sz="half" idx="10"/>
+          </p:nvPr>
+        </p:nvSpPr>
+        <p:spPr/>
+        <p:txBody>
+          <a:bodyPr/>
+          <a:lstStyle/>
+          <a:p>
+            <a:pPr>
+              <a:defRPr/>
+            </a:pPr>
+            <a:fld id="{214F5F98-C06E-4B49-A19C-86E8EF8C3A8B}" type="datetime1">
+              <a:rPr lang="de-AT" smtClean="0"/>
+              <a:t>25.01.2016</a:t>
+            </a:fld>
+            <a:endParaRPr lang="de-AT" dirty="0"/>
+          </a:p>
+        </p:txBody>
+      </p:sp>
+      <p:sp>
+        <p:nvSpPr>
+          <p:cNvPr id="3" name="Fußzeilenplatzhalter 2"/>
+          <p:cNvSpPr>
+            <a:spLocks noGrp="1"/>
+          </p:cNvSpPr>
+          <p:nvPr>
+            <p:ph type="ftr" sz="quarter" idx="11"/>
+          </p:nvPr>
+        </p:nvSpPr>
+        <p:spPr/>
+        <p:txBody>
+          <a:bodyPr/>
+          <a:lstStyle/>
+          <a:p>
+            <a:pPr>
+              <a:defRPr/>
+            </a:pPr>
+            <a:r>
+              <a:rPr lang="de-AT" smtClean="0"/>
+              <a:t>Silvana Podaras &amp; Florian Schober</a:t>
+            </a:r>
+            <a:endParaRPr lang="de-AT"/>
+          </a:p>
+        </p:txBody>
+      </p:sp>
+      <p:sp>
+        <p:nvSpPr>
+          <p:cNvPr id="4" name="Foliennummernplatzhalter 3"/>
+          <p:cNvSpPr>
+            <a:spLocks noGrp="1"/>
+          </p:cNvSpPr>
+          <p:nvPr>
+            <p:ph type="sldNum" sz="quarter" idx="12"/>
+          </p:nvPr>
+        </p:nvSpPr>
+        <p:spPr/>
+        <p:txBody>
+          <a:bodyPr/>
+          <a:lstStyle/>
+          <a:p>
+            <a:fld id="{CA3F91B5-C267-4146-949F-EABEA95DB02A}" type="slidenum">
+              <a:rPr lang="de-AT" altLang="de-DE" smtClean="0"/>
+              <a:pPr/>
+              <a:t>17</a:t>
+            </a:fld>
+            <a:endParaRPr lang="de-AT" altLang="de-DE"/>
+          </a:p>
+        </p:txBody>
+      </p:sp>
+      <p:pic>
+        <p:nvPicPr>
+          <p:cNvPr id="7" name="Picture 2" descr="https://encrypted-tbn1.gstatic.com/images?q=tbn:ANd9GcSHeZd9qwTw6uYFPJLtfTdhQ1pxTKLiDaGL0fIY7E0Fs5uVBNUNuA"/>
+          <p:cNvPicPr>
+            <a:picLocks noChangeAspect="1" noChangeArrowheads="1"/>
+          </p:cNvPicPr>
+          <p:nvPr/>
+        </p:nvPicPr>
+        <p:blipFill>
+          <a:blip r:embed="rId2">
+            <a:extLst>
+              <a:ext uri="{28A0092B-C50C-407E-A947-70E740481C1C}">
+                <a14:useLocalDpi xmlns:a14="http://schemas.microsoft.com/office/drawing/2010/main" val="0"/>
+              </a:ext>
+            </a:extLst>
+          </a:blip>
+          <a:srcRect/>
+          <a:stretch>
+            <a:fillRect/>
+          </a:stretch>
+        </p:blipFill>
+        <p:spPr bwMode="auto">
+          <a:xfrm>
+            <a:off x="7524328" y="1120242"/>
+            <a:ext cx="661356" cy="1232116"/>
+          </a:xfrm>
+          <a:prstGeom prst="rect">
+            <a:avLst/>
+          </a:prstGeom>
+          <a:noFill/>
+          <a:extLst>
+            <a:ext uri="{909E8E84-426E-40DD-AFC4-6F175D3DCCD1}">
+              <a14:hiddenFill xmlns:a14="http://schemas.microsoft.com/office/drawing/2010/main">
+                <a:solidFill>
+                  <a:srgbClr val="FFFFFF"/>
+                </a:solidFill>
+              </a14:hiddenFill>
+            </a:ext>
+          </a:extLst>
+        </p:spPr>
+      </p:pic>
+      <p:sp>
+        <p:nvSpPr>
+          <p:cNvPr id="8" name="Nach rechts gekrümmter Pfeil 7"/>
+          <p:cNvSpPr/>
+          <p:nvPr/>
+        </p:nvSpPr>
+        <p:spPr>
+          <a:xfrm>
+            <a:off x="6720011" y="1455889"/>
+            <a:ext cx="616412" cy="821882"/>
+          </a:xfrm>
+          <a:prstGeom prst="curvedRightArrow">
+            <a:avLst/>
+          </a:prstGeom>
+          <a:solidFill>
+            <a:schemeClr val="tx1"/>
+          </a:solidFill>
+          <a:ln>
+            <a:noFill/>
+          </a:ln>
+        </p:spPr>
+        <p:style>
+          <a:lnRef idx="2">
+            <a:schemeClr val="accent1">
+              <a:shade val="50000"/>
+            </a:schemeClr>
+          </a:lnRef>
+          <a:fillRef idx="1">
+            <a:schemeClr val="accent1"/>
+          </a:fillRef>
+          <a:effectRef idx="0">
+            <a:schemeClr val="accent1"/>
+          </a:effectRef>
+          <a:fontRef idx="minor">
+            <a:schemeClr val="lt1"/>
+          </a:fontRef>
+        </p:style>
+        <p:txBody>
+          <a:bodyPr rtlCol="0" anchor="ctr"/>
+          <a:lstStyle/>
+          <a:p>
+            <a:pPr algn="ctr"/>
+            <a:endParaRPr lang="de-AT">
+              <a:solidFill>
+                <a:schemeClr val="tx1"/>
+              </a:solidFill>
+            </a:endParaRPr>
+          </a:p>
+        </p:txBody>
+      </p:sp>
+    </p:spTree>
+    <p:extLst>
+      <p:ext uri="{BB962C8B-B14F-4D97-AF65-F5344CB8AC3E}">
+        <p14:creationId xmlns:p14="http://schemas.microsoft.com/office/powerpoint/2010/main" val="1960767466"/>
+      </p:ext>
+    </p:extLst>
+  </p:cSld>
+  <p:clrMapOvr>
+    <a:masterClrMapping/>
+  </p:clrMapOvr>
+  <p:timing>
+    <p:tnLst>
+      <p:par>
+        <p:cTn id="1" dur="indefinite" restart="never" nodeType="tmRoot"/>
+      </p:par>
+    </p:tnLst>
+  </p:timing>
+</p:sld>
+</file>
+
+<file path=ppt/slides/slide18.xml><?xml version="1.0" encoding="utf-8"?>
+<p:sld xmlns:a="http://schemas.openxmlformats.org/drawingml/2006/main" xmlns:r="http://schemas.openxmlformats.org/officeDocument/2006/relationships" xmlns:p="http://schemas.openxmlformats.org/presentationml/2006/main">
+  <p:cSld>
+    <p:spTree>
+      <p:nvGrpSpPr>
+        <p:cNvPr id="1" name=""/>
+        <p:cNvGrpSpPr/>
+        <p:nvPr/>
+      </p:nvGrpSpPr>
+      <p:grpSpPr>
+        <a:xfrm>
+          <a:off x="0" y="0"/>
+          <a:ext cx="0" cy="0"/>
+          <a:chOff x="0" y="0"/>
+          <a:chExt cx="0" cy="0"/>
+        </a:xfrm>
+      </p:grpSpPr>
+      <p:sp>
+        <p:nvSpPr>
+          <p:cNvPr id="5" name="Titel 4"/>
+          <p:cNvSpPr>
+            <a:spLocks noGrp="1"/>
+          </p:cNvSpPr>
+          <p:nvPr>
+            <p:ph type="title"/>
+          </p:nvPr>
+        </p:nvSpPr>
+        <p:spPr/>
+        <p:txBody>
+          <a:bodyPr/>
+          <a:lstStyle/>
+          <a:p>
+            <a:r>
+              <a:rPr lang="de-AT" dirty="0" smtClean="0"/>
               <a:t>Structured </a:t>
             </a:r>
             <a:r>
@@ -6558,7 +9519,7 @@
             <a:fld id="{CA3F91B5-C267-4146-949F-EABEA95DB02A}" type="slidenum">
               <a:rPr lang="de-AT" altLang="de-DE" smtClean="0"/>
               <a:pPr/>
-              <a:t>13</a:t>
+              <a:t>18</a:t>
             </a:fld>
             <a:endParaRPr lang="de-AT" altLang="de-DE"/>
           </a:p>
@@ -6584,7 +9545,7 @@
 </p:sld>
 </file>
 
-<file path=ppt/slides/slide14.xml><?xml version="1.0" encoding="utf-8"?>
+<file path=ppt/slides/slide19.xml><?xml version="1.0" encoding="utf-8"?>
 <p:sld xmlns:a="http://schemas.openxmlformats.org/drawingml/2006/main" xmlns:r="http://schemas.openxmlformats.org/officeDocument/2006/relationships" xmlns:p="http://schemas.openxmlformats.org/presentationml/2006/main">
   <p:cSld>
     <p:spTree>
@@ -6798,7 +9759,7 @@
             <a:fld id="{CA3F91B5-C267-4146-949F-EABEA95DB02A}" type="slidenum">
               <a:rPr lang="de-AT" altLang="de-DE" smtClean="0"/>
               <a:pPr/>
-              <a:t>14</a:t>
+              <a:t>19</a:t>
             </a:fld>
             <a:endParaRPr lang="de-AT" altLang="de-DE"/>
           </a:p>
@@ -6808,511 +9769,6 @@
     <p:extLst>
       <p:ext uri="{BB962C8B-B14F-4D97-AF65-F5344CB8AC3E}">
         <p14:creationId xmlns:p14="http://schemas.microsoft.com/office/powerpoint/2010/main" val="4076193232"/>
-      </p:ext>
-    </p:extLst>
-  </p:cSld>
-  <p:clrMapOvr>
-    <a:masterClrMapping/>
-  </p:clrMapOvr>
-  <p:timing>
-    <p:tnLst>
-      <p:par>
-        <p:cTn id="1" dur="indefinite" restart="never" nodeType="tmRoot"/>
-      </p:par>
-    </p:tnLst>
-  </p:timing>
-</p:sld>
-</file>
-
-<file path=ppt/slides/slide15.xml><?xml version="1.0" encoding="utf-8"?>
-<p:sld xmlns:a="http://schemas.openxmlformats.org/drawingml/2006/main" xmlns:r="http://schemas.openxmlformats.org/officeDocument/2006/relationships" xmlns:p="http://schemas.openxmlformats.org/presentationml/2006/main">
-  <p:cSld>
-    <p:spTree>
-      <p:nvGrpSpPr>
-        <p:cNvPr id="1" name=""/>
-        <p:cNvGrpSpPr/>
-        <p:nvPr/>
-      </p:nvGrpSpPr>
-      <p:grpSpPr>
-        <a:xfrm>
-          <a:off x="0" y="0"/>
-          <a:ext cx="0" cy="0"/>
-          <a:chOff x="0" y="0"/>
-          <a:chExt cx="0" cy="0"/>
-        </a:xfrm>
-      </p:grpSpPr>
-      <p:sp>
-        <p:nvSpPr>
-          <p:cNvPr id="5" name="Titel 4"/>
-          <p:cNvSpPr>
-            <a:spLocks noGrp="1"/>
-          </p:cNvSpPr>
-          <p:nvPr>
-            <p:ph type="title"/>
-          </p:nvPr>
-        </p:nvSpPr>
-        <p:spPr/>
-        <p:txBody>
-          <a:bodyPr/>
-          <a:lstStyle/>
-          <a:p>
-            <a:r>
-              <a:rPr lang="de-AT" dirty="0" err="1" smtClean="0"/>
-              <a:t>Applications</a:t>
-            </a:r>
-            <a:endParaRPr lang="de-AT" dirty="0"/>
-          </a:p>
-        </p:txBody>
-      </p:sp>
-      <p:sp>
-        <p:nvSpPr>
-          <p:cNvPr id="6" name="Inhaltsplatzhalter 5"/>
-          <p:cNvSpPr>
-            <a:spLocks noGrp="1"/>
-          </p:cNvSpPr>
-          <p:nvPr>
-            <p:ph idx="1"/>
-          </p:nvPr>
-        </p:nvSpPr>
-        <p:spPr/>
-        <p:txBody>
-          <a:bodyPr/>
-          <a:lstStyle/>
-          <a:p>
-            <a:pPr>
-              <a:buFont typeface="Arial" panose="020B0604020202020204" pitchFamily="34" charset="0"/>
-              <a:buChar char="•"/>
-            </a:pPr>
-            <a:r>
-              <a:rPr lang="de-AT" dirty="0" err="1"/>
-              <a:t>Classification</a:t>
-            </a:r>
-            <a:r>
-              <a:rPr lang="de-AT" dirty="0"/>
-              <a:t>/ </a:t>
-            </a:r>
-            <a:r>
-              <a:rPr lang="de-AT" dirty="0" err="1"/>
-              <a:t>pattern</a:t>
-            </a:r>
-            <a:r>
-              <a:rPr lang="de-AT" dirty="0"/>
-              <a:t> </a:t>
-            </a:r>
-            <a:r>
-              <a:rPr lang="de-AT" dirty="0" err="1"/>
-              <a:t>recognition</a:t>
-            </a:r>
-            <a:endParaRPr lang="de-AT" dirty="0"/>
-          </a:p>
-          <a:p>
-            <a:pPr>
-              <a:buFont typeface="Arial" panose="020B0604020202020204" pitchFamily="34" charset="0"/>
-              <a:buChar char="•"/>
-            </a:pPr>
-            <a:r>
-              <a:rPr lang="de-AT" dirty="0"/>
-              <a:t>Data </a:t>
-            </a:r>
-            <a:r>
-              <a:rPr lang="de-AT" dirty="0" err="1"/>
-              <a:t>representation</a:t>
-            </a:r>
-            <a:endParaRPr lang="de-AT" dirty="0"/>
-          </a:p>
-          <a:p>
-            <a:pPr>
-              <a:buFont typeface="Arial" panose="020B0604020202020204" pitchFamily="34" charset="0"/>
-              <a:buChar char="•"/>
-            </a:pPr>
-            <a:r>
-              <a:rPr lang="de-AT" dirty="0" err="1"/>
-              <a:t>Prediction</a:t>
-            </a:r>
-            <a:endParaRPr lang="de-AT" dirty="0"/>
-          </a:p>
-        </p:txBody>
-      </p:sp>
-      <p:sp>
-        <p:nvSpPr>
-          <p:cNvPr id="2" name="Datumsplatzhalter 1"/>
-          <p:cNvSpPr>
-            <a:spLocks noGrp="1"/>
-          </p:cNvSpPr>
-          <p:nvPr>
-            <p:ph type="dt" sz="half" idx="10"/>
-          </p:nvPr>
-        </p:nvSpPr>
-        <p:spPr/>
-        <p:txBody>
-          <a:bodyPr/>
-          <a:lstStyle/>
-          <a:p>
-            <a:pPr>
-              <a:defRPr/>
-            </a:pPr>
-            <a:fld id="{908BDE4A-9991-4FD0-90A7-2A1AC2958297}" type="datetime1">
-              <a:rPr lang="de-AT" smtClean="0"/>
-              <a:t>25.01.2016</a:t>
-            </a:fld>
-            <a:endParaRPr lang="de-AT" dirty="0"/>
-          </a:p>
-        </p:txBody>
-      </p:sp>
-      <p:sp>
-        <p:nvSpPr>
-          <p:cNvPr id="3" name="Fußzeilenplatzhalter 2"/>
-          <p:cNvSpPr>
-            <a:spLocks noGrp="1"/>
-          </p:cNvSpPr>
-          <p:nvPr>
-            <p:ph type="ftr" sz="quarter" idx="11"/>
-          </p:nvPr>
-        </p:nvSpPr>
-        <p:spPr/>
-        <p:txBody>
-          <a:bodyPr/>
-          <a:lstStyle/>
-          <a:p>
-            <a:pPr>
-              <a:defRPr/>
-            </a:pPr>
-            <a:r>
-              <a:rPr lang="de-AT" smtClean="0"/>
-              <a:t>Silvana Podaras &amp; Florian Schober</a:t>
-            </a:r>
-            <a:endParaRPr lang="de-AT"/>
-          </a:p>
-        </p:txBody>
-      </p:sp>
-      <p:sp>
-        <p:nvSpPr>
-          <p:cNvPr id="4" name="Foliennummernplatzhalter 3"/>
-          <p:cNvSpPr>
-            <a:spLocks noGrp="1"/>
-          </p:cNvSpPr>
-          <p:nvPr>
-            <p:ph type="sldNum" sz="quarter" idx="12"/>
-          </p:nvPr>
-        </p:nvSpPr>
-        <p:spPr/>
-        <p:txBody>
-          <a:bodyPr/>
-          <a:lstStyle/>
-          <a:p>
-            <a:fld id="{CA3F91B5-C267-4146-949F-EABEA95DB02A}" type="slidenum">
-              <a:rPr lang="de-AT" altLang="de-DE" smtClean="0"/>
-              <a:pPr/>
-              <a:t>15</a:t>
-            </a:fld>
-            <a:endParaRPr lang="de-AT" altLang="de-DE"/>
-          </a:p>
-        </p:txBody>
-      </p:sp>
-    </p:spTree>
-    <p:extLst>
-      <p:ext uri="{BB962C8B-B14F-4D97-AF65-F5344CB8AC3E}">
-        <p14:creationId xmlns:p14="http://schemas.microsoft.com/office/powerpoint/2010/main" val="4227374127"/>
-      </p:ext>
-    </p:extLst>
-  </p:cSld>
-  <p:clrMapOvr>
-    <a:masterClrMapping/>
-  </p:clrMapOvr>
-  <p:timing>
-    <p:tnLst>
-      <p:par>
-        <p:cTn id="1" dur="indefinite" restart="never" nodeType="tmRoot"/>
-      </p:par>
-    </p:tnLst>
-  </p:timing>
-</p:sld>
-</file>
-
-<file path=ppt/slides/slide16.xml><?xml version="1.0" encoding="utf-8"?>
-<p:sld xmlns:a="http://schemas.openxmlformats.org/drawingml/2006/main" xmlns:r="http://schemas.openxmlformats.org/officeDocument/2006/relationships" xmlns:p="http://schemas.openxmlformats.org/presentationml/2006/main">
-  <p:cSld>
-    <p:spTree>
-      <p:nvGrpSpPr>
-        <p:cNvPr id="1" name=""/>
-        <p:cNvGrpSpPr/>
-        <p:nvPr/>
-      </p:nvGrpSpPr>
-      <p:grpSpPr>
-        <a:xfrm>
-          <a:off x="0" y="0"/>
-          <a:ext cx="0" cy="0"/>
-          <a:chOff x="0" y="0"/>
-          <a:chExt cx="0" cy="0"/>
-        </a:xfrm>
-      </p:grpSpPr>
-      <p:sp>
-        <p:nvSpPr>
-          <p:cNvPr id="5" name="Titel 4"/>
-          <p:cNvSpPr>
-            <a:spLocks noGrp="1"/>
-          </p:cNvSpPr>
-          <p:nvPr>
-            <p:ph type="title"/>
-          </p:nvPr>
-        </p:nvSpPr>
-        <p:spPr>
-          <a:xfrm>
-            <a:off x="2771800" y="2924944"/>
-            <a:ext cx="2520280" cy="1143008"/>
-          </a:xfrm>
-        </p:spPr>
-        <p:txBody>
-          <a:bodyPr anchor="ctr"/>
-          <a:lstStyle/>
-          <a:p>
-            <a:r>
-              <a:rPr lang="de-AT" dirty="0" err="1" smtClean="0"/>
-              <a:t>Questions</a:t>
-            </a:r>
-            <a:r>
-              <a:rPr lang="de-AT" dirty="0" smtClean="0"/>
-              <a:t>?</a:t>
-            </a:r>
-            <a:endParaRPr lang="de-AT" dirty="0"/>
-          </a:p>
-        </p:txBody>
-      </p:sp>
-      <p:sp>
-        <p:nvSpPr>
-          <p:cNvPr id="2" name="Datumsplatzhalter 1"/>
-          <p:cNvSpPr>
-            <a:spLocks noGrp="1"/>
-          </p:cNvSpPr>
-          <p:nvPr>
-            <p:ph type="dt" sz="half" idx="10"/>
-          </p:nvPr>
-        </p:nvSpPr>
-        <p:spPr/>
-        <p:txBody>
-          <a:bodyPr/>
-          <a:lstStyle/>
-          <a:p>
-            <a:pPr>
-              <a:defRPr/>
-            </a:pPr>
-            <a:fld id="{D5D3703B-7C89-496B-8219-C11379F90AE7}" type="datetime1">
-              <a:rPr lang="de-AT" smtClean="0"/>
-              <a:t>25.01.2016</a:t>
-            </a:fld>
-            <a:endParaRPr lang="de-AT" dirty="0"/>
-          </a:p>
-        </p:txBody>
-      </p:sp>
-      <p:sp>
-        <p:nvSpPr>
-          <p:cNvPr id="3" name="Fußzeilenplatzhalter 2"/>
-          <p:cNvSpPr>
-            <a:spLocks noGrp="1"/>
-          </p:cNvSpPr>
-          <p:nvPr>
-            <p:ph type="ftr" sz="quarter" idx="11"/>
-          </p:nvPr>
-        </p:nvSpPr>
-        <p:spPr/>
-        <p:txBody>
-          <a:bodyPr/>
-          <a:lstStyle/>
-          <a:p>
-            <a:pPr>
-              <a:defRPr/>
-            </a:pPr>
-            <a:r>
-              <a:rPr lang="de-AT" smtClean="0"/>
-              <a:t>Silvana Podaras &amp; Florian Schober</a:t>
-            </a:r>
-            <a:endParaRPr lang="de-AT"/>
-          </a:p>
-        </p:txBody>
-      </p:sp>
-      <p:sp>
-        <p:nvSpPr>
-          <p:cNvPr id="4" name="Foliennummernplatzhalter 3"/>
-          <p:cNvSpPr>
-            <a:spLocks noGrp="1"/>
-          </p:cNvSpPr>
-          <p:nvPr>
-            <p:ph type="sldNum" sz="quarter" idx="12"/>
-          </p:nvPr>
-        </p:nvSpPr>
-        <p:spPr/>
-        <p:txBody>
-          <a:bodyPr/>
-          <a:lstStyle/>
-          <a:p>
-            <a:fld id="{CA3F91B5-C267-4146-949F-EABEA95DB02A}" type="slidenum">
-              <a:rPr lang="de-AT" altLang="de-DE" smtClean="0"/>
-              <a:pPr/>
-              <a:t>16</a:t>
-            </a:fld>
-            <a:endParaRPr lang="de-AT" altLang="de-DE"/>
-          </a:p>
-        </p:txBody>
-      </p:sp>
-    </p:spTree>
-    <p:extLst>
-      <p:ext uri="{BB962C8B-B14F-4D97-AF65-F5344CB8AC3E}">
-        <p14:creationId xmlns:p14="http://schemas.microsoft.com/office/powerpoint/2010/main" val="539449402"/>
-      </p:ext>
-    </p:extLst>
-  </p:cSld>
-  <p:clrMapOvr>
-    <a:masterClrMapping/>
-  </p:clrMapOvr>
-  <p:timing>
-    <p:tnLst>
-      <p:par>
-        <p:cTn id="1" dur="indefinite" restart="never" nodeType="tmRoot"/>
-      </p:par>
-    </p:tnLst>
-  </p:timing>
-</p:sld>
-</file>
-
-<file path=ppt/slides/slide17.xml><?xml version="1.0" encoding="utf-8"?>
-<p:sld xmlns:a="http://schemas.openxmlformats.org/drawingml/2006/main" xmlns:r="http://schemas.openxmlformats.org/officeDocument/2006/relationships" xmlns:p="http://schemas.openxmlformats.org/presentationml/2006/main">
-  <p:cSld>
-    <p:spTree>
-      <p:nvGrpSpPr>
-        <p:cNvPr id="1" name=""/>
-        <p:cNvGrpSpPr/>
-        <p:nvPr/>
-      </p:nvGrpSpPr>
-      <p:grpSpPr>
-        <a:xfrm>
-          <a:off x="0" y="0"/>
-          <a:ext cx="0" cy="0"/>
-          <a:chOff x="0" y="0"/>
-          <a:chExt cx="0" cy="0"/>
-        </a:xfrm>
-      </p:grpSpPr>
-      <p:sp>
-        <p:nvSpPr>
-          <p:cNvPr id="5" name="Titel 4"/>
-          <p:cNvSpPr>
-            <a:spLocks noGrp="1"/>
-          </p:cNvSpPr>
-          <p:nvPr>
-            <p:ph type="title"/>
-          </p:nvPr>
-        </p:nvSpPr>
-        <p:spPr/>
-        <p:txBody>
-          <a:bodyPr/>
-          <a:lstStyle/>
-          <a:p>
-            <a:r>
-              <a:rPr lang="de-AT" dirty="0" err="1" smtClean="0"/>
-              <a:t>Literature</a:t>
-            </a:r>
-            <a:endParaRPr lang="de-AT" dirty="0"/>
-          </a:p>
-        </p:txBody>
-      </p:sp>
-      <p:sp>
-        <p:nvSpPr>
-          <p:cNvPr id="6" name="Inhaltsplatzhalter 5"/>
-          <p:cNvSpPr>
-            <a:spLocks noGrp="1"/>
-          </p:cNvSpPr>
-          <p:nvPr>
-            <p:ph idx="1"/>
-          </p:nvPr>
-        </p:nvSpPr>
-        <p:spPr/>
-        <p:txBody>
-          <a:bodyPr/>
-          <a:lstStyle/>
-          <a:p>
-            <a:endParaRPr lang="de-AT" dirty="0"/>
-          </a:p>
-        </p:txBody>
-      </p:sp>
-      <p:sp>
-        <p:nvSpPr>
-          <p:cNvPr id="2" name="Datumsplatzhalter 1"/>
-          <p:cNvSpPr>
-            <a:spLocks noGrp="1"/>
-          </p:cNvSpPr>
-          <p:nvPr>
-            <p:ph type="dt" sz="half" idx="10"/>
-          </p:nvPr>
-        </p:nvSpPr>
-        <p:spPr/>
-        <p:txBody>
-          <a:bodyPr/>
-          <a:lstStyle/>
-          <a:p>
-            <a:pPr>
-              <a:defRPr/>
-            </a:pPr>
-            <a:fld id="{F9ECDA19-35E9-44D8-ABD2-5D6049D7FF67}" type="datetime1">
-              <a:rPr lang="de-AT" smtClean="0"/>
-              <a:t>25.01.2016</a:t>
-            </a:fld>
-            <a:endParaRPr lang="de-AT" dirty="0"/>
-          </a:p>
-        </p:txBody>
-      </p:sp>
-      <p:sp>
-        <p:nvSpPr>
-          <p:cNvPr id="3" name="Fußzeilenplatzhalter 2"/>
-          <p:cNvSpPr>
-            <a:spLocks noGrp="1"/>
-          </p:cNvSpPr>
-          <p:nvPr>
-            <p:ph type="ftr" sz="quarter" idx="11"/>
-          </p:nvPr>
-        </p:nvSpPr>
-        <p:spPr/>
-        <p:txBody>
-          <a:bodyPr/>
-          <a:lstStyle/>
-          <a:p>
-            <a:pPr>
-              <a:defRPr/>
-            </a:pPr>
-            <a:r>
-              <a:rPr lang="de-AT" smtClean="0"/>
-              <a:t>Silvana Podaras &amp; Florian Schober</a:t>
-            </a:r>
-            <a:endParaRPr lang="de-AT"/>
-          </a:p>
-        </p:txBody>
-      </p:sp>
-      <p:sp>
-        <p:nvSpPr>
-          <p:cNvPr id="4" name="Foliennummernplatzhalter 3"/>
-          <p:cNvSpPr>
-            <a:spLocks noGrp="1"/>
-          </p:cNvSpPr>
-          <p:nvPr>
-            <p:ph type="sldNum" sz="quarter" idx="12"/>
-          </p:nvPr>
-        </p:nvSpPr>
-        <p:spPr/>
-        <p:txBody>
-          <a:bodyPr/>
-          <a:lstStyle/>
-          <a:p>
-            <a:fld id="{CA3F91B5-C267-4146-949F-EABEA95DB02A}" type="slidenum">
-              <a:rPr lang="de-AT" altLang="de-DE" smtClean="0"/>
-              <a:pPr/>
-              <a:t>17</a:t>
-            </a:fld>
-            <a:endParaRPr lang="de-AT" altLang="de-DE"/>
-          </a:p>
-        </p:txBody>
-      </p:sp>
-    </p:spTree>
-    <p:extLst>
-      <p:ext uri="{BB962C8B-B14F-4D97-AF65-F5344CB8AC3E}">
-        <p14:creationId xmlns:p14="http://schemas.microsoft.com/office/powerpoint/2010/main" val="3209622137"/>
       </p:ext>
     </p:extLst>
   </p:cSld>
@@ -7706,6 +10162,511 @@
 </p:sld>
 </file>
 
+<file path=ppt/slides/slide20.xml><?xml version="1.0" encoding="utf-8"?>
+<p:sld xmlns:a="http://schemas.openxmlformats.org/drawingml/2006/main" xmlns:r="http://schemas.openxmlformats.org/officeDocument/2006/relationships" xmlns:p="http://schemas.openxmlformats.org/presentationml/2006/main">
+  <p:cSld>
+    <p:spTree>
+      <p:nvGrpSpPr>
+        <p:cNvPr id="1" name=""/>
+        <p:cNvGrpSpPr/>
+        <p:nvPr/>
+      </p:nvGrpSpPr>
+      <p:grpSpPr>
+        <a:xfrm>
+          <a:off x="0" y="0"/>
+          <a:ext cx="0" cy="0"/>
+          <a:chOff x="0" y="0"/>
+          <a:chExt cx="0" cy="0"/>
+        </a:xfrm>
+      </p:grpSpPr>
+      <p:sp>
+        <p:nvSpPr>
+          <p:cNvPr id="5" name="Titel 4"/>
+          <p:cNvSpPr>
+            <a:spLocks noGrp="1"/>
+          </p:cNvSpPr>
+          <p:nvPr>
+            <p:ph type="title"/>
+          </p:nvPr>
+        </p:nvSpPr>
+        <p:spPr/>
+        <p:txBody>
+          <a:bodyPr/>
+          <a:lstStyle/>
+          <a:p>
+            <a:r>
+              <a:rPr lang="de-AT" dirty="0" err="1" smtClean="0"/>
+              <a:t>Applications</a:t>
+            </a:r>
+            <a:endParaRPr lang="de-AT" dirty="0"/>
+          </a:p>
+        </p:txBody>
+      </p:sp>
+      <p:sp>
+        <p:nvSpPr>
+          <p:cNvPr id="6" name="Inhaltsplatzhalter 5"/>
+          <p:cNvSpPr>
+            <a:spLocks noGrp="1"/>
+          </p:cNvSpPr>
+          <p:nvPr>
+            <p:ph idx="1"/>
+          </p:nvPr>
+        </p:nvSpPr>
+        <p:spPr/>
+        <p:txBody>
+          <a:bodyPr/>
+          <a:lstStyle/>
+          <a:p>
+            <a:pPr>
+              <a:buFont typeface="Arial" panose="020B0604020202020204" pitchFamily="34" charset="0"/>
+              <a:buChar char="•"/>
+            </a:pPr>
+            <a:r>
+              <a:rPr lang="de-AT" dirty="0" err="1"/>
+              <a:t>Classification</a:t>
+            </a:r>
+            <a:r>
+              <a:rPr lang="de-AT" dirty="0"/>
+              <a:t>/ </a:t>
+            </a:r>
+            <a:r>
+              <a:rPr lang="de-AT" dirty="0" err="1"/>
+              <a:t>pattern</a:t>
+            </a:r>
+            <a:r>
+              <a:rPr lang="de-AT" dirty="0"/>
+              <a:t> </a:t>
+            </a:r>
+            <a:r>
+              <a:rPr lang="de-AT" dirty="0" err="1"/>
+              <a:t>recognition</a:t>
+            </a:r>
+            <a:endParaRPr lang="de-AT" dirty="0"/>
+          </a:p>
+          <a:p>
+            <a:pPr>
+              <a:buFont typeface="Arial" panose="020B0604020202020204" pitchFamily="34" charset="0"/>
+              <a:buChar char="•"/>
+            </a:pPr>
+            <a:r>
+              <a:rPr lang="de-AT" dirty="0"/>
+              <a:t>Data </a:t>
+            </a:r>
+            <a:r>
+              <a:rPr lang="de-AT" dirty="0" err="1"/>
+              <a:t>representation</a:t>
+            </a:r>
+            <a:endParaRPr lang="de-AT" dirty="0"/>
+          </a:p>
+          <a:p>
+            <a:pPr>
+              <a:buFont typeface="Arial" panose="020B0604020202020204" pitchFamily="34" charset="0"/>
+              <a:buChar char="•"/>
+            </a:pPr>
+            <a:r>
+              <a:rPr lang="de-AT" dirty="0" err="1"/>
+              <a:t>Prediction</a:t>
+            </a:r>
+            <a:endParaRPr lang="de-AT" dirty="0"/>
+          </a:p>
+        </p:txBody>
+      </p:sp>
+      <p:sp>
+        <p:nvSpPr>
+          <p:cNvPr id="2" name="Datumsplatzhalter 1"/>
+          <p:cNvSpPr>
+            <a:spLocks noGrp="1"/>
+          </p:cNvSpPr>
+          <p:nvPr>
+            <p:ph type="dt" sz="half" idx="10"/>
+          </p:nvPr>
+        </p:nvSpPr>
+        <p:spPr/>
+        <p:txBody>
+          <a:bodyPr/>
+          <a:lstStyle/>
+          <a:p>
+            <a:pPr>
+              <a:defRPr/>
+            </a:pPr>
+            <a:fld id="{908BDE4A-9991-4FD0-90A7-2A1AC2958297}" type="datetime1">
+              <a:rPr lang="de-AT" smtClean="0"/>
+              <a:t>25.01.2016</a:t>
+            </a:fld>
+            <a:endParaRPr lang="de-AT" dirty="0"/>
+          </a:p>
+        </p:txBody>
+      </p:sp>
+      <p:sp>
+        <p:nvSpPr>
+          <p:cNvPr id="3" name="Fußzeilenplatzhalter 2"/>
+          <p:cNvSpPr>
+            <a:spLocks noGrp="1"/>
+          </p:cNvSpPr>
+          <p:nvPr>
+            <p:ph type="ftr" sz="quarter" idx="11"/>
+          </p:nvPr>
+        </p:nvSpPr>
+        <p:spPr/>
+        <p:txBody>
+          <a:bodyPr/>
+          <a:lstStyle/>
+          <a:p>
+            <a:pPr>
+              <a:defRPr/>
+            </a:pPr>
+            <a:r>
+              <a:rPr lang="de-AT" smtClean="0"/>
+              <a:t>Silvana Podaras &amp; Florian Schober</a:t>
+            </a:r>
+            <a:endParaRPr lang="de-AT"/>
+          </a:p>
+        </p:txBody>
+      </p:sp>
+      <p:sp>
+        <p:nvSpPr>
+          <p:cNvPr id="4" name="Foliennummernplatzhalter 3"/>
+          <p:cNvSpPr>
+            <a:spLocks noGrp="1"/>
+          </p:cNvSpPr>
+          <p:nvPr>
+            <p:ph type="sldNum" sz="quarter" idx="12"/>
+          </p:nvPr>
+        </p:nvSpPr>
+        <p:spPr/>
+        <p:txBody>
+          <a:bodyPr/>
+          <a:lstStyle/>
+          <a:p>
+            <a:fld id="{CA3F91B5-C267-4146-949F-EABEA95DB02A}" type="slidenum">
+              <a:rPr lang="de-AT" altLang="de-DE" smtClean="0"/>
+              <a:pPr/>
+              <a:t>20</a:t>
+            </a:fld>
+            <a:endParaRPr lang="de-AT" altLang="de-DE"/>
+          </a:p>
+        </p:txBody>
+      </p:sp>
+    </p:spTree>
+    <p:extLst>
+      <p:ext uri="{BB962C8B-B14F-4D97-AF65-F5344CB8AC3E}">
+        <p14:creationId xmlns:p14="http://schemas.microsoft.com/office/powerpoint/2010/main" val="4227374127"/>
+      </p:ext>
+    </p:extLst>
+  </p:cSld>
+  <p:clrMapOvr>
+    <a:masterClrMapping/>
+  </p:clrMapOvr>
+  <p:timing>
+    <p:tnLst>
+      <p:par>
+        <p:cTn id="1" dur="indefinite" restart="never" nodeType="tmRoot"/>
+      </p:par>
+    </p:tnLst>
+  </p:timing>
+</p:sld>
+</file>
+
+<file path=ppt/slides/slide21.xml><?xml version="1.0" encoding="utf-8"?>
+<p:sld xmlns:a="http://schemas.openxmlformats.org/drawingml/2006/main" xmlns:r="http://schemas.openxmlformats.org/officeDocument/2006/relationships" xmlns:p="http://schemas.openxmlformats.org/presentationml/2006/main">
+  <p:cSld>
+    <p:spTree>
+      <p:nvGrpSpPr>
+        <p:cNvPr id="1" name=""/>
+        <p:cNvGrpSpPr/>
+        <p:nvPr/>
+      </p:nvGrpSpPr>
+      <p:grpSpPr>
+        <a:xfrm>
+          <a:off x="0" y="0"/>
+          <a:ext cx="0" cy="0"/>
+          <a:chOff x="0" y="0"/>
+          <a:chExt cx="0" cy="0"/>
+        </a:xfrm>
+      </p:grpSpPr>
+      <p:sp>
+        <p:nvSpPr>
+          <p:cNvPr id="5" name="Titel 4"/>
+          <p:cNvSpPr>
+            <a:spLocks noGrp="1"/>
+          </p:cNvSpPr>
+          <p:nvPr>
+            <p:ph type="title"/>
+          </p:nvPr>
+        </p:nvSpPr>
+        <p:spPr>
+          <a:xfrm>
+            <a:off x="2771800" y="2924944"/>
+            <a:ext cx="2520280" cy="1143008"/>
+          </a:xfrm>
+        </p:spPr>
+        <p:txBody>
+          <a:bodyPr anchor="ctr"/>
+          <a:lstStyle/>
+          <a:p>
+            <a:r>
+              <a:rPr lang="de-AT" dirty="0" err="1" smtClean="0"/>
+              <a:t>Questions</a:t>
+            </a:r>
+            <a:r>
+              <a:rPr lang="de-AT" dirty="0" smtClean="0"/>
+              <a:t>?</a:t>
+            </a:r>
+            <a:endParaRPr lang="de-AT" dirty="0"/>
+          </a:p>
+        </p:txBody>
+      </p:sp>
+      <p:sp>
+        <p:nvSpPr>
+          <p:cNvPr id="2" name="Datumsplatzhalter 1"/>
+          <p:cNvSpPr>
+            <a:spLocks noGrp="1"/>
+          </p:cNvSpPr>
+          <p:nvPr>
+            <p:ph type="dt" sz="half" idx="10"/>
+          </p:nvPr>
+        </p:nvSpPr>
+        <p:spPr/>
+        <p:txBody>
+          <a:bodyPr/>
+          <a:lstStyle/>
+          <a:p>
+            <a:pPr>
+              <a:defRPr/>
+            </a:pPr>
+            <a:fld id="{D5D3703B-7C89-496B-8219-C11379F90AE7}" type="datetime1">
+              <a:rPr lang="de-AT" smtClean="0"/>
+              <a:t>25.01.2016</a:t>
+            </a:fld>
+            <a:endParaRPr lang="de-AT" dirty="0"/>
+          </a:p>
+        </p:txBody>
+      </p:sp>
+      <p:sp>
+        <p:nvSpPr>
+          <p:cNvPr id="3" name="Fußzeilenplatzhalter 2"/>
+          <p:cNvSpPr>
+            <a:spLocks noGrp="1"/>
+          </p:cNvSpPr>
+          <p:nvPr>
+            <p:ph type="ftr" sz="quarter" idx="11"/>
+          </p:nvPr>
+        </p:nvSpPr>
+        <p:spPr/>
+        <p:txBody>
+          <a:bodyPr/>
+          <a:lstStyle/>
+          <a:p>
+            <a:pPr>
+              <a:defRPr/>
+            </a:pPr>
+            <a:r>
+              <a:rPr lang="de-AT" smtClean="0"/>
+              <a:t>Silvana Podaras &amp; Florian Schober</a:t>
+            </a:r>
+            <a:endParaRPr lang="de-AT"/>
+          </a:p>
+        </p:txBody>
+      </p:sp>
+      <p:sp>
+        <p:nvSpPr>
+          <p:cNvPr id="4" name="Foliennummernplatzhalter 3"/>
+          <p:cNvSpPr>
+            <a:spLocks noGrp="1"/>
+          </p:cNvSpPr>
+          <p:nvPr>
+            <p:ph type="sldNum" sz="quarter" idx="12"/>
+          </p:nvPr>
+        </p:nvSpPr>
+        <p:spPr/>
+        <p:txBody>
+          <a:bodyPr/>
+          <a:lstStyle/>
+          <a:p>
+            <a:fld id="{CA3F91B5-C267-4146-949F-EABEA95DB02A}" type="slidenum">
+              <a:rPr lang="de-AT" altLang="de-DE" smtClean="0"/>
+              <a:pPr/>
+              <a:t>21</a:t>
+            </a:fld>
+            <a:endParaRPr lang="de-AT" altLang="de-DE"/>
+          </a:p>
+        </p:txBody>
+      </p:sp>
+    </p:spTree>
+    <p:extLst>
+      <p:ext uri="{BB962C8B-B14F-4D97-AF65-F5344CB8AC3E}">
+        <p14:creationId xmlns:p14="http://schemas.microsoft.com/office/powerpoint/2010/main" val="539449402"/>
+      </p:ext>
+    </p:extLst>
+  </p:cSld>
+  <p:clrMapOvr>
+    <a:masterClrMapping/>
+  </p:clrMapOvr>
+  <p:timing>
+    <p:tnLst>
+      <p:par>
+        <p:cTn id="1" dur="indefinite" restart="never" nodeType="tmRoot"/>
+      </p:par>
+    </p:tnLst>
+  </p:timing>
+</p:sld>
+</file>
+
+<file path=ppt/slides/slide22.xml><?xml version="1.0" encoding="utf-8"?>
+<p:sld xmlns:a="http://schemas.openxmlformats.org/drawingml/2006/main" xmlns:r="http://schemas.openxmlformats.org/officeDocument/2006/relationships" xmlns:p="http://schemas.openxmlformats.org/presentationml/2006/main">
+  <p:cSld>
+    <p:spTree>
+      <p:nvGrpSpPr>
+        <p:cNvPr id="1" name=""/>
+        <p:cNvGrpSpPr/>
+        <p:nvPr/>
+      </p:nvGrpSpPr>
+      <p:grpSpPr>
+        <a:xfrm>
+          <a:off x="0" y="0"/>
+          <a:ext cx="0" cy="0"/>
+          <a:chOff x="0" y="0"/>
+          <a:chExt cx="0" cy="0"/>
+        </a:xfrm>
+      </p:grpSpPr>
+      <p:sp>
+        <p:nvSpPr>
+          <p:cNvPr id="5" name="Titel 4"/>
+          <p:cNvSpPr>
+            <a:spLocks noGrp="1"/>
+          </p:cNvSpPr>
+          <p:nvPr>
+            <p:ph type="title"/>
+          </p:nvPr>
+        </p:nvSpPr>
+        <p:spPr/>
+        <p:txBody>
+          <a:bodyPr/>
+          <a:lstStyle/>
+          <a:p>
+            <a:r>
+              <a:rPr lang="de-AT" dirty="0" err="1" smtClean="0"/>
+              <a:t>Literature</a:t>
+            </a:r>
+            <a:endParaRPr lang="de-AT" dirty="0"/>
+          </a:p>
+        </p:txBody>
+      </p:sp>
+      <p:sp>
+        <p:nvSpPr>
+          <p:cNvPr id="6" name="Inhaltsplatzhalter 5"/>
+          <p:cNvSpPr>
+            <a:spLocks noGrp="1"/>
+          </p:cNvSpPr>
+          <p:nvPr>
+            <p:ph idx="1"/>
+          </p:nvPr>
+        </p:nvSpPr>
+        <p:spPr/>
+        <p:txBody>
+          <a:bodyPr/>
+          <a:lstStyle/>
+          <a:p>
+            <a:endParaRPr lang="de-AT" dirty="0"/>
+          </a:p>
+        </p:txBody>
+      </p:sp>
+      <p:sp>
+        <p:nvSpPr>
+          <p:cNvPr id="2" name="Datumsplatzhalter 1"/>
+          <p:cNvSpPr>
+            <a:spLocks noGrp="1"/>
+          </p:cNvSpPr>
+          <p:nvPr>
+            <p:ph type="dt" sz="half" idx="10"/>
+          </p:nvPr>
+        </p:nvSpPr>
+        <p:spPr/>
+        <p:txBody>
+          <a:bodyPr/>
+          <a:lstStyle/>
+          <a:p>
+            <a:pPr>
+              <a:defRPr/>
+            </a:pPr>
+            <a:fld id="{F9ECDA19-35E9-44D8-ABD2-5D6049D7FF67}" type="datetime1">
+              <a:rPr lang="de-AT" smtClean="0"/>
+              <a:t>25.01.2016</a:t>
+            </a:fld>
+            <a:endParaRPr lang="de-AT" dirty="0"/>
+          </a:p>
+        </p:txBody>
+      </p:sp>
+      <p:sp>
+        <p:nvSpPr>
+          <p:cNvPr id="3" name="Fußzeilenplatzhalter 2"/>
+          <p:cNvSpPr>
+            <a:spLocks noGrp="1"/>
+          </p:cNvSpPr>
+          <p:nvPr>
+            <p:ph type="ftr" sz="quarter" idx="11"/>
+          </p:nvPr>
+        </p:nvSpPr>
+        <p:spPr/>
+        <p:txBody>
+          <a:bodyPr/>
+          <a:lstStyle/>
+          <a:p>
+            <a:pPr>
+              <a:defRPr/>
+            </a:pPr>
+            <a:r>
+              <a:rPr lang="de-AT" smtClean="0"/>
+              <a:t>Silvana Podaras &amp; Florian Schober</a:t>
+            </a:r>
+            <a:endParaRPr lang="de-AT"/>
+          </a:p>
+        </p:txBody>
+      </p:sp>
+      <p:sp>
+        <p:nvSpPr>
+          <p:cNvPr id="4" name="Foliennummernplatzhalter 3"/>
+          <p:cNvSpPr>
+            <a:spLocks noGrp="1"/>
+          </p:cNvSpPr>
+          <p:nvPr>
+            <p:ph type="sldNum" sz="quarter" idx="12"/>
+          </p:nvPr>
+        </p:nvSpPr>
+        <p:spPr/>
+        <p:txBody>
+          <a:bodyPr/>
+          <a:lstStyle/>
+          <a:p>
+            <a:fld id="{CA3F91B5-C267-4146-949F-EABEA95DB02A}" type="slidenum">
+              <a:rPr lang="de-AT" altLang="de-DE" smtClean="0"/>
+              <a:pPr/>
+              <a:t>22</a:t>
+            </a:fld>
+            <a:endParaRPr lang="de-AT" altLang="de-DE"/>
+          </a:p>
+        </p:txBody>
+      </p:sp>
+    </p:spTree>
+    <p:extLst>
+      <p:ext uri="{BB962C8B-B14F-4D97-AF65-F5344CB8AC3E}">
+        <p14:creationId xmlns:p14="http://schemas.microsoft.com/office/powerpoint/2010/main" val="3209622137"/>
+      </p:ext>
+    </p:extLst>
+  </p:cSld>
+  <p:clrMapOvr>
+    <a:masterClrMapping/>
+  </p:clrMapOvr>
+  <p:timing>
+    <p:tnLst>
+      <p:par>
+        <p:cTn id="1" dur="indefinite" restart="never" nodeType="tmRoot"/>
+      </p:par>
+    </p:tnLst>
+  </p:timing>
+</p:sld>
+</file>
+
 <file path=ppt/slides/slide3.xml><?xml version="1.0" encoding="utf-8"?>
 <p:sld xmlns:a="http://schemas.openxmlformats.org/drawingml/2006/main" xmlns:r="http://schemas.openxmlformats.org/officeDocument/2006/relationships" xmlns:p="http://schemas.openxmlformats.org/presentationml/2006/main">
   <p:cSld>
@@ -8426,9 +11387,12 @@
               <a:t>Discriminating </a:t>
             </a:r>
             <a:r>
-              <a:rPr lang="en-US" dirty="0"/>
+              <a:rPr lang="en-US" dirty="0" smtClean="0"/>
               <a:t>features</a:t>
             </a:r>
+          </a:p>
+          <a:p>
+            <a:pPr marL="0" indent="0"/>
             <a:endParaRPr lang="de-AT" dirty="0"/>
           </a:p>
         </p:txBody>
@@ -8827,8 +11791,13 @@
             </a:r>
             <a:r>
               <a:rPr lang="en-US" dirty="0"/>
-              <a:t>relation to each other</a:t>
-            </a:r>
+              <a:t>relation to each </a:t>
+            </a:r>
+            <a:r>
+              <a:rPr lang="en-US" dirty="0" smtClean="0"/>
+              <a:t>other</a:t>
+            </a:r>
+            <a:endParaRPr lang="en-US" dirty="0"/>
           </a:p>
           <a:p>
             <a:pPr>

</xml_diff>